<commit_message>
not sure why this rename didn't go through the first time...
</commit_message>
<xml_diff>
--- a/Intro to MVC and Web API - Denver Dev Days/Introduction to MVC and Web API.pptx
+++ b/Intro to MVC and Web API - Denver Dev Days/Introduction to MVC and Web API.pptx
@@ -11232,7 +11232,7 @@
                 </a:solidFill>
                 <a:latin typeface="Trebuchet MS" pitchFamily="34" charset="0"/>
               </a:rPr>
-              <a:t>Where do MVC and Web API fit in today?</a:t>
+              <a:t>Where do MVC and Web API fit in today’s web?</a:t>
             </a:r>
           </a:p>
           <a:p>
@@ -11305,6 +11305,37 @@
               </a:rPr>
               <a:t>Web API</a:t>
             </a:r>
+          </a:p>
+          <a:p>
+            <a:pPr>
+              <a:lnSpc>
+                <a:spcPct val="200000"/>
+              </a:lnSpc>
+            </a:pPr>
+            <a:r>
+              <a:rPr lang="en-US" sz="2400" b="1" dirty="0" smtClean="0">
+                <a:solidFill>
+                  <a:schemeClr val="tx1">
+                    <a:lumMod val="50000"/>
+                    <a:lumOff val="50000"/>
+                  </a:schemeClr>
+                </a:solidFill>
+                <a:latin typeface="Trebuchet MS" pitchFamily="34" charset="0"/>
+              </a:rPr>
+              <a:t>What </a:t>
+            </a:r>
+            <a:r>
+              <a:rPr lang="en-US" sz="2400" b="1" smtClean="0">
+                <a:solidFill>
+                  <a:schemeClr val="tx1">
+                    <a:lumMod val="50000"/>
+                    <a:lumOff val="50000"/>
+                  </a:schemeClr>
+                </a:solidFill>
+                <a:latin typeface="Trebuchet MS" pitchFamily="34" charset="0"/>
+              </a:rPr>
+              <a:t>about testing?</a:t>
+            </a:r>
             <a:endParaRPr lang="en-US" sz="2400" b="1" dirty="0">
               <a:solidFill>
                 <a:schemeClr val="tx1">
@@ -11331,19 +11362,7 @@
                 </a:solidFill>
                 <a:latin typeface="Trebuchet MS" pitchFamily="34" charset="0"/>
               </a:rPr>
-              <a:t>Are MVC or Web API a fit for </a:t>
-            </a:r>
-            <a:r>
-              <a:rPr lang="en-US" sz="2400" b="1" smtClean="0">
-                <a:solidFill>
-                  <a:schemeClr val="tx1">
-                    <a:lumMod val="50000"/>
-                    <a:lumOff val="50000"/>
-                  </a:schemeClr>
-                </a:solidFill>
-                <a:latin typeface="Trebuchet MS" pitchFamily="34" charset="0"/>
-              </a:rPr>
-              <a:t>your project?</a:t>
+              <a:t>Are MVC or Web API a fit for your project?</a:t>
             </a:r>
             <a:endParaRPr lang="en-US" sz="2400" b="1" dirty="0">
               <a:solidFill>

</xml_diff>

<commit_message>
more updates to slides
</commit_message>
<xml_diff>
--- a/Intro to MVC and Web API - Denver Dev Days/Introduction to MVC and Web API.pptx
+++ b/Intro to MVC and Web API - Denver Dev Days/Introduction to MVC and Web API.pptx
@@ -28,17 +28,17 @@
     <p:sldId id="300" r:id="rId16"/>
     <p:sldId id="259" r:id="rId17"/>
     <p:sldId id="260" r:id="rId18"/>
-    <p:sldId id="296" r:id="rId19"/>
-    <p:sldId id="292" r:id="rId20"/>
-    <p:sldId id="262" r:id="rId21"/>
-    <p:sldId id="276" r:id="rId22"/>
-    <p:sldId id="277" r:id="rId23"/>
-    <p:sldId id="285" r:id="rId24"/>
-    <p:sldId id="286" r:id="rId25"/>
-    <p:sldId id="287" r:id="rId26"/>
-    <p:sldId id="288" r:id="rId27"/>
-    <p:sldId id="289" r:id="rId28"/>
-    <p:sldId id="266" r:id="rId29"/>
+    <p:sldId id="292" r:id="rId19"/>
+    <p:sldId id="296" r:id="rId20"/>
+    <p:sldId id="301" r:id="rId21"/>
+    <p:sldId id="262" r:id="rId22"/>
+    <p:sldId id="276" r:id="rId23"/>
+    <p:sldId id="277" r:id="rId24"/>
+    <p:sldId id="285" r:id="rId25"/>
+    <p:sldId id="286" r:id="rId26"/>
+    <p:sldId id="287" r:id="rId27"/>
+    <p:sldId id="288" r:id="rId28"/>
+    <p:sldId id="289" r:id="rId29"/>
     <p:sldId id="264" r:id="rId30"/>
     <p:sldId id="295" r:id="rId31"/>
     <p:sldId id="258" r:id="rId32"/>
@@ -1041,7 +1041,7 @@
                 </a:solidFill>
               </a:rPr>
               <a:pPr/>
-              <a:t>19</a:t>
+              <a:t>18</a:t>
             </a:fld>
             <a:endParaRPr lang="en-US" dirty="0">
               <a:solidFill>
@@ -1132,7 +1132,7 @@
             <a:fld id="{A53BD44F-18A8-46C3-8E60-05A8A5D6CFFD}" type="slidenum">
               <a:rPr lang="en-US" smtClean="0"/>
               <a:pPr/>
-              <a:t>23</a:t>
+              <a:t>24</a:t>
             </a:fld>
             <a:endParaRPr lang="en-US" dirty="0"/>
           </a:p>
@@ -1219,7 +1219,7 @@
             <a:fld id="{A53BD44F-18A8-46C3-8E60-05A8A5D6CFFD}" type="slidenum">
               <a:rPr lang="en-US" smtClean="0"/>
               <a:pPr/>
-              <a:t>24</a:t>
+              <a:t>25</a:t>
             </a:fld>
             <a:endParaRPr lang="en-US" dirty="0"/>
           </a:p>
@@ -1306,7 +1306,7 @@
             <a:fld id="{A53BD44F-18A8-46C3-8E60-05A8A5D6CFFD}" type="slidenum">
               <a:rPr lang="en-US" smtClean="0"/>
               <a:pPr/>
-              <a:t>25</a:t>
+              <a:t>26</a:t>
             </a:fld>
             <a:endParaRPr lang="en-US" dirty="0"/>
           </a:p>
@@ -1393,7 +1393,7 @@
             <a:fld id="{A53BD44F-18A8-46C3-8E60-05A8A5D6CFFD}" type="slidenum">
               <a:rPr lang="en-US" smtClean="0"/>
               <a:pPr/>
-              <a:t>26</a:t>
+              <a:t>27</a:t>
             </a:fld>
             <a:endParaRPr lang="en-US" dirty="0"/>
           </a:p>
@@ -1480,7 +1480,7 @@
             <a:fld id="{A53BD44F-18A8-46C3-8E60-05A8A5D6CFFD}" type="slidenum">
               <a:rPr lang="en-US" smtClean="0"/>
               <a:pPr/>
-              <a:t>27</a:t>
+              <a:t>28</a:t>
             </a:fld>
             <a:endParaRPr lang="en-US" dirty="0"/>
           </a:p>
@@ -5216,7 +5216,11 @@
             </a:br>
             <a:r>
               <a:rPr lang="en-US" dirty="0" smtClean="0"/>
-              <a:t>ASP.NET MVC and Web API</a:t>
+              <a:t>ASP.NET </a:t>
+            </a:r>
+            <a:r>
+              <a:rPr lang="en-US" dirty="0" smtClean="0"/>
+              <a:t>MVC</a:t>
             </a:r>
             <a:endParaRPr lang="en-US" dirty="0"/>
           </a:p>
@@ -5448,8 +5452,8 @@
         </p:blipFill>
         <p:spPr>
           <a:xfrm>
-            <a:off x="685800" y="1676400"/>
-            <a:ext cx="4738789" cy="2667000"/>
+            <a:off x="685801" y="1676400"/>
+            <a:ext cx="6096000" cy="3430841"/>
           </a:xfrm>
           <a:prstGeom prst="rect">
             <a:avLst/>
@@ -5605,7 +5609,7 @@
         <p:spPr/>
         <p:txBody>
           <a:bodyPr>
-            <a:normAutofit/>
+            <a:normAutofit fontScale="92500" lnSpcReduction="10000"/>
           </a:bodyPr>
           <a:lstStyle/>
           <a:p>
@@ -5642,6 +5646,35 @@
             <a:r>
               <a:rPr lang="en-US" sz="2400" dirty="0" smtClean="0"/>
               <a:t> to style pages the same for entire app</a:t>
+            </a:r>
+          </a:p>
+          <a:p>
+            <a:endParaRPr lang="en-US" sz="2400" dirty="0" smtClean="0"/>
+          </a:p>
+          <a:p>
+            <a:r>
+              <a:rPr lang="en-US" sz="2400" dirty="0" smtClean="0"/>
+              <a:t>Show Model data with </a:t>
+            </a:r>
+            <a:r>
+              <a:rPr lang="en-US" sz="2400" dirty="0"/>
+              <a:t>@Model </a:t>
+            </a:r>
+            <a:r>
+              <a:rPr lang="en-US" sz="2400" dirty="0" smtClean="0"/>
+              <a:t>.something </a:t>
+            </a:r>
+            <a:r>
+              <a:rPr lang="en-US" sz="2400" dirty="0" smtClean="0"/>
+              <a:t>or @</a:t>
+            </a:r>
+            <a:r>
+              <a:rPr lang="en-US" sz="2400" dirty="0" err="1" smtClean="0"/>
+              <a:t>ViewBag</a:t>
+            </a:r>
+            <a:r>
+              <a:rPr lang="en-US" sz="2400" dirty="0" smtClean="0"/>
+              <a:t>&lt;something</a:t>
             </a:r>
           </a:p>
           <a:p>
@@ -6363,7 +6396,11 @@
           <a:p>
             <a:r>
               <a:rPr lang="en-US" dirty="0" smtClean="0"/>
-              <a:t>Basics of MVC – Views</a:t>
+              <a:t>Basics of MVC – </a:t>
+            </a:r>
+            <a:r>
+              <a:rPr lang="en-US" dirty="0" smtClean="0"/>
+              <a:t>Views (Edit form)</a:t>
             </a:r>
             <a:endParaRPr lang="en-US" dirty="0"/>
           </a:p>
@@ -6419,7 +6456,7 @@
       </p:sp>
       <p:pic>
         <p:nvPicPr>
-          <p:cNvPr id="5" name="Picture 4"/>
+          <p:cNvPr id="8" name="Picture 7"/>
           <p:cNvPicPr>
             <a:picLocks noChangeAspect="1"/>
           </p:cNvPicPr>
@@ -6433,14 +6470,366 @@
         </p:blipFill>
         <p:spPr>
           <a:xfrm>
-            <a:off x="114110" y="1353862"/>
-            <a:ext cx="8877490" cy="5351738"/>
+            <a:off x="762000" y="1371600"/>
+            <a:ext cx="6426030" cy="4876800"/>
           </a:xfrm>
           <a:prstGeom prst="rect">
             <a:avLst/>
           </a:prstGeom>
         </p:spPr>
       </p:pic>
+      <p:sp>
+        <p:nvSpPr>
+          <p:cNvPr id="11" name="Right Arrow 10"/>
+          <p:cNvSpPr/>
+          <p:nvPr/>
+        </p:nvSpPr>
+        <p:spPr>
+          <a:xfrm rot="10800000">
+            <a:off x="3352800" y="1347789"/>
+            <a:ext cx="406483" cy="381000"/>
+          </a:xfrm>
+          <a:prstGeom prst="rightArrow">
+            <a:avLst/>
+          </a:prstGeom>
+        </p:spPr>
+        <p:style>
+          <a:lnRef idx="2">
+            <a:schemeClr val="accent1">
+              <a:shade val="50000"/>
+            </a:schemeClr>
+          </a:lnRef>
+          <a:fillRef idx="1">
+            <a:schemeClr val="accent1"/>
+          </a:fillRef>
+          <a:effectRef idx="0">
+            <a:schemeClr val="accent1"/>
+          </a:effectRef>
+          <a:fontRef idx="minor">
+            <a:schemeClr val="lt1"/>
+          </a:fontRef>
+        </p:style>
+        <p:txBody>
+          <a:bodyPr rtlCol="0" anchor="ctr"/>
+          <a:lstStyle/>
+          <a:p>
+            <a:pPr algn="ctr"/>
+            <a:endParaRPr lang="en-US">
+              <a:solidFill>
+                <a:schemeClr val="tx1"/>
+              </a:solidFill>
+            </a:endParaRPr>
+          </a:p>
+        </p:txBody>
+      </p:sp>
+      <p:sp>
+        <p:nvSpPr>
+          <p:cNvPr id="12" name="Right Arrow 11"/>
+          <p:cNvSpPr/>
+          <p:nvPr/>
+        </p:nvSpPr>
+        <p:spPr>
+          <a:xfrm rot="10800000">
+            <a:off x="5562600" y="1997676"/>
+            <a:ext cx="406483" cy="381000"/>
+          </a:xfrm>
+          <a:prstGeom prst="rightArrow">
+            <a:avLst/>
+          </a:prstGeom>
+        </p:spPr>
+        <p:style>
+          <a:lnRef idx="2">
+            <a:schemeClr val="accent1">
+              <a:shade val="50000"/>
+            </a:schemeClr>
+          </a:lnRef>
+          <a:fillRef idx="1">
+            <a:schemeClr val="accent1"/>
+          </a:fillRef>
+          <a:effectRef idx="0">
+            <a:schemeClr val="accent1"/>
+          </a:effectRef>
+          <a:fontRef idx="minor">
+            <a:schemeClr val="lt1"/>
+          </a:fontRef>
+        </p:style>
+        <p:txBody>
+          <a:bodyPr rtlCol="0" anchor="ctr"/>
+          <a:lstStyle/>
+          <a:p>
+            <a:pPr algn="ctr"/>
+            <a:endParaRPr lang="en-US">
+              <a:solidFill>
+                <a:schemeClr val="tx1"/>
+              </a:solidFill>
+            </a:endParaRPr>
+          </a:p>
+        </p:txBody>
+      </p:sp>
+      <p:sp>
+        <p:nvSpPr>
+          <p:cNvPr id="13" name="Right Arrow 12"/>
+          <p:cNvSpPr/>
+          <p:nvPr/>
+        </p:nvSpPr>
+        <p:spPr>
+          <a:xfrm rot="10800000">
+            <a:off x="5460917" y="3758514"/>
+            <a:ext cx="406483" cy="381000"/>
+          </a:xfrm>
+          <a:prstGeom prst="rightArrow">
+            <a:avLst/>
+          </a:prstGeom>
+        </p:spPr>
+        <p:style>
+          <a:lnRef idx="2">
+            <a:schemeClr val="accent1">
+              <a:shade val="50000"/>
+            </a:schemeClr>
+          </a:lnRef>
+          <a:fillRef idx="1">
+            <a:schemeClr val="accent1"/>
+          </a:fillRef>
+          <a:effectRef idx="0">
+            <a:schemeClr val="accent1"/>
+          </a:effectRef>
+          <a:fontRef idx="minor">
+            <a:schemeClr val="lt1"/>
+          </a:fontRef>
+        </p:style>
+        <p:txBody>
+          <a:bodyPr rtlCol="0" anchor="ctr"/>
+          <a:lstStyle/>
+          <a:p>
+            <a:pPr algn="ctr"/>
+            <a:endParaRPr lang="en-US">
+              <a:solidFill>
+                <a:schemeClr val="tx1"/>
+              </a:solidFill>
+            </a:endParaRPr>
+          </a:p>
+        </p:txBody>
+      </p:sp>
+      <p:sp>
+        <p:nvSpPr>
+          <p:cNvPr id="14" name="Right Arrow 13"/>
+          <p:cNvSpPr/>
+          <p:nvPr/>
+        </p:nvSpPr>
+        <p:spPr>
+          <a:xfrm rot="10800000">
+            <a:off x="6070517" y="2438400"/>
+            <a:ext cx="406483" cy="381000"/>
+          </a:xfrm>
+          <a:prstGeom prst="rightArrow">
+            <a:avLst/>
+          </a:prstGeom>
+        </p:spPr>
+        <p:style>
+          <a:lnRef idx="2">
+            <a:schemeClr val="accent1">
+              <a:shade val="50000"/>
+            </a:schemeClr>
+          </a:lnRef>
+          <a:fillRef idx="1">
+            <a:schemeClr val="accent1"/>
+          </a:fillRef>
+          <a:effectRef idx="0">
+            <a:schemeClr val="accent1"/>
+          </a:effectRef>
+          <a:fontRef idx="minor">
+            <a:schemeClr val="lt1"/>
+          </a:fontRef>
+        </p:style>
+        <p:txBody>
+          <a:bodyPr rtlCol="0" anchor="ctr"/>
+          <a:lstStyle/>
+          <a:p>
+            <a:pPr algn="ctr"/>
+            <a:endParaRPr lang="en-US">
+              <a:solidFill>
+                <a:schemeClr val="tx1"/>
+              </a:solidFill>
+            </a:endParaRPr>
+          </a:p>
+        </p:txBody>
+      </p:sp>
+      <p:sp>
+        <p:nvSpPr>
+          <p:cNvPr id="15" name="Right Arrow 14"/>
+          <p:cNvSpPr/>
+          <p:nvPr/>
+        </p:nvSpPr>
+        <p:spPr>
+          <a:xfrm rot="10800000">
+            <a:off x="5929953" y="4191000"/>
+            <a:ext cx="406483" cy="381000"/>
+          </a:xfrm>
+          <a:prstGeom prst="rightArrow">
+            <a:avLst/>
+          </a:prstGeom>
+        </p:spPr>
+        <p:style>
+          <a:lnRef idx="2">
+            <a:schemeClr val="accent1">
+              <a:shade val="50000"/>
+            </a:schemeClr>
+          </a:lnRef>
+          <a:fillRef idx="1">
+            <a:schemeClr val="accent1"/>
+          </a:fillRef>
+          <a:effectRef idx="0">
+            <a:schemeClr val="accent1"/>
+          </a:effectRef>
+          <a:fontRef idx="minor">
+            <a:schemeClr val="lt1"/>
+          </a:fontRef>
+        </p:style>
+        <p:txBody>
+          <a:bodyPr rtlCol="0" anchor="ctr"/>
+          <a:lstStyle/>
+          <a:p>
+            <a:pPr algn="ctr"/>
+            <a:endParaRPr lang="en-US">
+              <a:solidFill>
+                <a:schemeClr val="tx1"/>
+              </a:solidFill>
+            </a:endParaRPr>
+          </a:p>
+        </p:txBody>
+      </p:sp>
+      <p:sp>
+        <p:nvSpPr>
+          <p:cNvPr id="17" name="Right Arrow 16"/>
+          <p:cNvSpPr/>
+          <p:nvPr/>
+        </p:nvSpPr>
+        <p:spPr>
+          <a:xfrm rot="10800000">
+            <a:off x="7118138" y="2660694"/>
+            <a:ext cx="406483" cy="381000"/>
+          </a:xfrm>
+          <a:prstGeom prst="rightArrow">
+            <a:avLst/>
+          </a:prstGeom>
+        </p:spPr>
+        <p:style>
+          <a:lnRef idx="2">
+            <a:schemeClr val="accent1">
+              <a:shade val="50000"/>
+            </a:schemeClr>
+          </a:lnRef>
+          <a:fillRef idx="1">
+            <a:schemeClr val="accent1"/>
+          </a:fillRef>
+          <a:effectRef idx="0">
+            <a:schemeClr val="accent1"/>
+          </a:effectRef>
+          <a:fontRef idx="minor">
+            <a:schemeClr val="lt1"/>
+          </a:fontRef>
+        </p:style>
+        <p:txBody>
+          <a:bodyPr rtlCol="0" anchor="ctr"/>
+          <a:lstStyle/>
+          <a:p>
+            <a:pPr algn="ctr"/>
+            <a:endParaRPr lang="en-US">
+              <a:solidFill>
+                <a:schemeClr val="tx1"/>
+              </a:solidFill>
+            </a:endParaRPr>
+          </a:p>
+        </p:txBody>
+      </p:sp>
+      <p:sp>
+        <p:nvSpPr>
+          <p:cNvPr id="18" name="Right Arrow 17"/>
+          <p:cNvSpPr/>
+          <p:nvPr/>
+        </p:nvSpPr>
+        <p:spPr>
+          <a:xfrm rot="10800000">
+            <a:off x="7019286" y="4411362"/>
+            <a:ext cx="406483" cy="381000"/>
+          </a:xfrm>
+          <a:prstGeom prst="rightArrow">
+            <a:avLst/>
+          </a:prstGeom>
+        </p:spPr>
+        <p:style>
+          <a:lnRef idx="2">
+            <a:schemeClr val="accent1">
+              <a:shade val="50000"/>
+            </a:schemeClr>
+          </a:lnRef>
+          <a:fillRef idx="1">
+            <a:schemeClr val="accent1"/>
+          </a:fillRef>
+          <a:effectRef idx="0">
+            <a:schemeClr val="accent1"/>
+          </a:effectRef>
+          <a:fontRef idx="minor">
+            <a:schemeClr val="lt1"/>
+          </a:fontRef>
+        </p:style>
+        <p:txBody>
+          <a:bodyPr rtlCol="0" anchor="ctr"/>
+          <a:lstStyle/>
+          <a:p>
+            <a:pPr algn="ctr"/>
+            <a:endParaRPr lang="en-US">
+              <a:solidFill>
+                <a:schemeClr val="tx1"/>
+              </a:solidFill>
+            </a:endParaRPr>
+          </a:p>
+        </p:txBody>
+      </p:sp>
+      <p:sp>
+        <p:nvSpPr>
+          <p:cNvPr id="19" name="Right Arrow 18"/>
+          <p:cNvSpPr/>
+          <p:nvPr/>
+        </p:nvSpPr>
+        <p:spPr>
+          <a:xfrm rot="10800000">
+            <a:off x="5156117" y="5508992"/>
+            <a:ext cx="406483" cy="381000"/>
+          </a:xfrm>
+          <a:prstGeom prst="rightArrow">
+            <a:avLst/>
+          </a:prstGeom>
+        </p:spPr>
+        <p:style>
+          <a:lnRef idx="2">
+            <a:schemeClr val="accent1">
+              <a:shade val="50000"/>
+            </a:schemeClr>
+          </a:lnRef>
+          <a:fillRef idx="1">
+            <a:schemeClr val="accent1"/>
+          </a:fillRef>
+          <a:effectRef idx="0">
+            <a:schemeClr val="accent1"/>
+          </a:effectRef>
+          <a:fontRef idx="minor">
+            <a:schemeClr val="lt1"/>
+          </a:fontRef>
+        </p:style>
+        <p:txBody>
+          <a:bodyPr rtlCol="0" anchor="ctr"/>
+          <a:lstStyle/>
+          <a:p>
+            <a:pPr algn="ctr"/>
+            <a:endParaRPr lang="en-US">
+              <a:solidFill>
+                <a:schemeClr val="tx1"/>
+              </a:solidFill>
+            </a:endParaRPr>
+          </a:p>
+        </p:txBody>
+      </p:sp>
     </p:spTree>
     <p:extLst>
       <p:ext uri="{BB962C8B-B14F-4D97-AF65-F5344CB8AC3E}">
@@ -6457,9 +6846,394 @@
   <p:timing>
     <p:tnLst>
       <p:par>
-        <p:cTn id="1" dur="indefinite" restart="never" nodeType="tmRoot"/>
+        <p:cTn id="1" dur="indefinite" restart="never" nodeType="tmRoot">
+          <p:childTnLst>
+            <p:seq concurrent="1" nextAc="seek">
+              <p:cTn id="2" dur="indefinite" nodeType="mainSeq">
+                <p:childTnLst>
+                  <p:par>
+                    <p:cTn id="3" fill="hold">
+                      <p:stCondLst>
+                        <p:cond delay="indefinite"/>
+                      </p:stCondLst>
+                      <p:childTnLst>
+                        <p:par>
+                          <p:cTn id="4" fill="hold">
+                            <p:stCondLst>
+                              <p:cond delay="0"/>
+                            </p:stCondLst>
+                            <p:childTnLst>
+                              <p:par>
+                                <p:cTn id="5" presetID="4" presetClass="entr" presetSubtype="16" fill="hold" grpId="1" nodeType="clickEffect">
+                                  <p:stCondLst>
+                                    <p:cond delay="0"/>
+                                  </p:stCondLst>
+                                  <p:childTnLst>
+                                    <p:set>
+                                      <p:cBhvr>
+                                        <p:cTn id="6" dur="1" fill="hold">
+                                          <p:stCondLst>
+                                            <p:cond delay="0"/>
+                                          </p:stCondLst>
+                                        </p:cTn>
+                                        <p:tgtEl>
+                                          <p:spTgt spid="11"/>
+                                        </p:tgtEl>
+                                        <p:attrNameLst>
+                                          <p:attrName>style.visibility</p:attrName>
+                                        </p:attrNameLst>
+                                      </p:cBhvr>
+                                      <p:to>
+                                        <p:strVal val="visible"/>
+                                      </p:to>
+                                    </p:set>
+                                    <p:animEffect transition="in" filter="box(in)">
+                                      <p:cBhvr>
+                                        <p:cTn id="7" dur="500"/>
+                                        <p:tgtEl>
+                                          <p:spTgt spid="11"/>
+                                        </p:tgtEl>
+                                      </p:cBhvr>
+                                    </p:animEffect>
+                                  </p:childTnLst>
+                                </p:cTn>
+                              </p:par>
+                              <p:par>
+                                <p:cTn id="8" presetID="4" presetClass="entr" presetSubtype="16" fill="hold" grpId="0" nodeType="withEffect">
+                                  <p:stCondLst>
+                                    <p:cond delay="0"/>
+                                  </p:stCondLst>
+                                  <p:childTnLst>
+                                    <p:set>
+                                      <p:cBhvr>
+                                        <p:cTn id="9" dur="1" fill="hold">
+                                          <p:stCondLst>
+                                            <p:cond delay="0"/>
+                                          </p:stCondLst>
+                                        </p:cTn>
+                                        <p:tgtEl>
+                                          <p:spTgt spid="19"/>
+                                        </p:tgtEl>
+                                        <p:attrNameLst>
+                                          <p:attrName>style.visibility</p:attrName>
+                                        </p:attrNameLst>
+                                      </p:cBhvr>
+                                      <p:to>
+                                        <p:strVal val="visible"/>
+                                      </p:to>
+                                    </p:set>
+                                    <p:animEffect transition="in" filter="box(in)">
+                                      <p:cBhvr>
+                                        <p:cTn id="10" dur="500"/>
+                                        <p:tgtEl>
+                                          <p:spTgt spid="19"/>
+                                        </p:tgtEl>
+                                      </p:cBhvr>
+                                    </p:animEffect>
+                                  </p:childTnLst>
+                                </p:cTn>
+                              </p:par>
+                            </p:childTnLst>
+                          </p:cTn>
+                        </p:par>
+                      </p:childTnLst>
+                    </p:cTn>
+                  </p:par>
+                  <p:par>
+                    <p:cTn id="11" fill="hold">
+                      <p:stCondLst>
+                        <p:cond delay="indefinite"/>
+                      </p:stCondLst>
+                      <p:childTnLst>
+                        <p:par>
+                          <p:cTn id="12" fill="hold">
+                            <p:stCondLst>
+                              <p:cond delay="0"/>
+                            </p:stCondLst>
+                            <p:childTnLst>
+                              <p:par>
+                                <p:cTn id="13" presetID="4" presetClass="entr" presetSubtype="16" fill="hold" grpId="1" nodeType="clickEffect">
+                                  <p:stCondLst>
+                                    <p:cond delay="0"/>
+                                  </p:stCondLst>
+                                  <p:childTnLst>
+                                    <p:set>
+                                      <p:cBhvr>
+                                        <p:cTn id="14" dur="1" fill="hold">
+                                          <p:stCondLst>
+                                            <p:cond delay="0"/>
+                                          </p:stCondLst>
+                                        </p:cTn>
+                                        <p:tgtEl>
+                                          <p:spTgt spid="12"/>
+                                        </p:tgtEl>
+                                        <p:attrNameLst>
+                                          <p:attrName>style.visibility</p:attrName>
+                                        </p:attrNameLst>
+                                      </p:cBhvr>
+                                      <p:to>
+                                        <p:strVal val="visible"/>
+                                      </p:to>
+                                    </p:set>
+                                    <p:animEffect transition="in" filter="box(in)">
+                                      <p:cBhvr>
+                                        <p:cTn id="15" dur="500"/>
+                                        <p:tgtEl>
+                                          <p:spTgt spid="12"/>
+                                        </p:tgtEl>
+                                      </p:cBhvr>
+                                    </p:animEffect>
+                                  </p:childTnLst>
+                                </p:cTn>
+                              </p:par>
+                              <p:par>
+                                <p:cTn id="16" presetID="4" presetClass="entr" presetSubtype="16" fill="hold" grpId="1" nodeType="withEffect">
+                                  <p:stCondLst>
+                                    <p:cond delay="0"/>
+                                  </p:stCondLst>
+                                  <p:childTnLst>
+                                    <p:set>
+                                      <p:cBhvr>
+                                        <p:cTn id="17" dur="1" fill="hold">
+                                          <p:stCondLst>
+                                            <p:cond delay="0"/>
+                                          </p:stCondLst>
+                                        </p:cTn>
+                                        <p:tgtEl>
+                                          <p:spTgt spid="13"/>
+                                        </p:tgtEl>
+                                        <p:attrNameLst>
+                                          <p:attrName>style.visibility</p:attrName>
+                                        </p:attrNameLst>
+                                      </p:cBhvr>
+                                      <p:to>
+                                        <p:strVal val="visible"/>
+                                      </p:to>
+                                    </p:set>
+                                    <p:animEffect transition="in" filter="box(in)">
+                                      <p:cBhvr>
+                                        <p:cTn id="18" dur="500"/>
+                                        <p:tgtEl>
+                                          <p:spTgt spid="13"/>
+                                        </p:tgtEl>
+                                      </p:cBhvr>
+                                    </p:animEffect>
+                                  </p:childTnLst>
+                                </p:cTn>
+                              </p:par>
+                            </p:childTnLst>
+                          </p:cTn>
+                        </p:par>
+                      </p:childTnLst>
+                    </p:cTn>
+                  </p:par>
+                  <p:par>
+                    <p:cTn id="19" fill="hold">
+                      <p:stCondLst>
+                        <p:cond delay="indefinite"/>
+                      </p:stCondLst>
+                      <p:childTnLst>
+                        <p:par>
+                          <p:cTn id="20" fill="hold">
+                            <p:stCondLst>
+                              <p:cond delay="0"/>
+                            </p:stCondLst>
+                            <p:childTnLst>
+                              <p:par>
+                                <p:cTn id="21" presetID="4" presetClass="entr" presetSubtype="16" fill="hold" grpId="1" nodeType="clickEffect">
+                                  <p:stCondLst>
+                                    <p:cond delay="0"/>
+                                  </p:stCondLst>
+                                  <p:childTnLst>
+                                    <p:set>
+                                      <p:cBhvr>
+                                        <p:cTn id="22" dur="1" fill="hold">
+                                          <p:stCondLst>
+                                            <p:cond delay="0"/>
+                                          </p:stCondLst>
+                                        </p:cTn>
+                                        <p:tgtEl>
+                                          <p:spTgt spid="14"/>
+                                        </p:tgtEl>
+                                        <p:attrNameLst>
+                                          <p:attrName>style.visibility</p:attrName>
+                                        </p:attrNameLst>
+                                      </p:cBhvr>
+                                      <p:to>
+                                        <p:strVal val="visible"/>
+                                      </p:to>
+                                    </p:set>
+                                    <p:animEffect transition="in" filter="box(in)">
+                                      <p:cBhvr>
+                                        <p:cTn id="23" dur="500"/>
+                                        <p:tgtEl>
+                                          <p:spTgt spid="14"/>
+                                        </p:tgtEl>
+                                      </p:cBhvr>
+                                    </p:animEffect>
+                                  </p:childTnLst>
+                                </p:cTn>
+                              </p:par>
+                              <p:par>
+                                <p:cTn id="24" presetID="4" presetClass="entr" presetSubtype="16" fill="hold" grpId="1" nodeType="withEffect">
+                                  <p:stCondLst>
+                                    <p:cond delay="0"/>
+                                  </p:stCondLst>
+                                  <p:childTnLst>
+                                    <p:set>
+                                      <p:cBhvr>
+                                        <p:cTn id="25" dur="1" fill="hold">
+                                          <p:stCondLst>
+                                            <p:cond delay="0"/>
+                                          </p:stCondLst>
+                                        </p:cTn>
+                                        <p:tgtEl>
+                                          <p:spTgt spid="15"/>
+                                        </p:tgtEl>
+                                        <p:attrNameLst>
+                                          <p:attrName>style.visibility</p:attrName>
+                                        </p:attrNameLst>
+                                      </p:cBhvr>
+                                      <p:to>
+                                        <p:strVal val="visible"/>
+                                      </p:to>
+                                    </p:set>
+                                    <p:animEffect transition="in" filter="box(in)">
+                                      <p:cBhvr>
+                                        <p:cTn id="26" dur="500"/>
+                                        <p:tgtEl>
+                                          <p:spTgt spid="15"/>
+                                        </p:tgtEl>
+                                      </p:cBhvr>
+                                    </p:animEffect>
+                                  </p:childTnLst>
+                                </p:cTn>
+                              </p:par>
+                            </p:childTnLst>
+                          </p:cTn>
+                        </p:par>
+                      </p:childTnLst>
+                    </p:cTn>
+                  </p:par>
+                  <p:par>
+                    <p:cTn id="27" fill="hold">
+                      <p:stCondLst>
+                        <p:cond delay="indefinite"/>
+                      </p:stCondLst>
+                      <p:childTnLst>
+                        <p:par>
+                          <p:cTn id="28" fill="hold">
+                            <p:stCondLst>
+                              <p:cond delay="0"/>
+                            </p:stCondLst>
+                            <p:childTnLst>
+                              <p:par>
+                                <p:cTn id="29" presetID="4" presetClass="entr" presetSubtype="16" fill="hold" grpId="1" nodeType="clickEffect">
+                                  <p:stCondLst>
+                                    <p:cond delay="0"/>
+                                  </p:stCondLst>
+                                  <p:childTnLst>
+                                    <p:set>
+                                      <p:cBhvr>
+                                        <p:cTn id="30" dur="1" fill="hold">
+                                          <p:stCondLst>
+                                            <p:cond delay="0"/>
+                                          </p:stCondLst>
+                                        </p:cTn>
+                                        <p:tgtEl>
+                                          <p:spTgt spid="17"/>
+                                        </p:tgtEl>
+                                        <p:attrNameLst>
+                                          <p:attrName>style.visibility</p:attrName>
+                                        </p:attrNameLst>
+                                      </p:cBhvr>
+                                      <p:to>
+                                        <p:strVal val="visible"/>
+                                      </p:to>
+                                    </p:set>
+                                    <p:animEffect transition="in" filter="box(in)">
+                                      <p:cBhvr>
+                                        <p:cTn id="31" dur="500"/>
+                                        <p:tgtEl>
+                                          <p:spTgt spid="17"/>
+                                        </p:tgtEl>
+                                      </p:cBhvr>
+                                    </p:animEffect>
+                                  </p:childTnLst>
+                                </p:cTn>
+                              </p:par>
+                              <p:par>
+                                <p:cTn id="32" presetID="4" presetClass="entr" presetSubtype="16" fill="hold" grpId="1" nodeType="withEffect">
+                                  <p:stCondLst>
+                                    <p:cond delay="0"/>
+                                  </p:stCondLst>
+                                  <p:childTnLst>
+                                    <p:set>
+                                      <p:cBhvr>
+                                        <p:cTn id="33" dur="1" fill="hold">
+                                          <p:stCondLst>
+                                            <p:cond delay="0"/>
+                                          </p:stCondLst>
+                                        </p:cTn>
+                                        <p:tgtEl>
+                                          <p:spTgt spid="18"/>
+                                        </p:tgtEl>
+                                        <p:attrNameLst>
+                                          <p:attrName>style.visibility</p:attrName>
+                                        </p:attrNameLst>
+                                      </p:cBhvr>
+                                      <p:to>
+                                        <p:strVal val="visible"/>
+                                      </p:to>
+                                    </p:set>
+                                    <p:animEffect transition="in" filter="box(in)">
+                                      <p:cBhvr>
+                                        <p:cTn id="34" dur="500"/>
+                                        <p:tgtEl>
+                                          <p:spTgt spid="18"/>
+                                        </p:tgtEl>
+                                      </p:cBhvr>
+                                    </p:animEffect>
+                                  </p:childTnLst>
+                                </p:cTn>
+                              </p:par>
+                            </p:childTnLst>
+                          </p:cTn>
+                        </p:par>
+                      </p:childTnLst>
+                    </p:cTn>
+                  </p:par>
+                </p:childTnLst>
+              </p:cTn>
+              <p:prevCondLst>
+                <p:cond evt="onPrev" delay="0">
+                  <p:tgtEl>
+                    <p:sldTgt/>
+                  </p:tgtEl>
+                </p:cond>
+              </p:prevCondLst>
+              <p:nextCondLst>
+                <p:cond evt="onNext" delay="0">
+                  <p:tgtEl>
+                    <p:sldTgt/>
+                  </p:tgtEl>
+                </p:cond>
+              </p:nextCondLst>
+            </p:seq>
+          </p:childTnLst>
+        </p:cTn>
       </p:par>
     </p:tnLst>
+    <p:bldLst>
+      <p:bldP spid="11" grpId="1" animBg="1"/>
+      <p:bldP spid="12" grpId="1" animBg="1"/>
+      <p:bldP spid="13" grpId="1" animBg="1"/>
+      <p:bldP spid="14" grpId="1" animBg="1"/>
+      <p:bldP spid="15" grpId="1" animBg="1"/>
+      <p:bldP spid="17" grpId="1" animBg="1"/>
+      <p:bldP spid="18" grpId="1" animBg="1"/>
+      <p:bldP spid="19" grpId="0" animBg="1"/>
+    </p:bldLst>
   </p:timing>
 </p:sld>
 </file>
@@ -6568,7 +7342,7 @@
         </p:blipFill>
         <p:spPr>
           <a:xfrm>
-            <a:off x="2272000" y="2291681"/>
+            <a:off x="2272000" y="2057400"/>
             <a:ext cx="4600000" cy="3361905"/>
           </a:xfrm>
           <a:prstGeom prst="rect">
@@ -6875,6 +7649,526 @@
           <a:chExt cx="0" cy="0"/>
         </a:xfrm>
       </p:grpSpPr>
+      <p:pic>
+        <p:nvPicPr>
+          <p:cNvPr id="3" name="Picture 2"/>
+          <p:cNvPicPr>
+            <a:picLocks noChangeAspect="1"/>
+          </p:cNvPicPr>
+          <p:nvPr/>
+        </p:nvPicPr>
+        <p:blipFill>
+          <a:blip r:embed="rId3"/>
+          <a:stretch>
+            <a:fillRect/>
+          </a:stretch>
+        </p:blipFill>
+        <p:spPr>
+          <a:xfrm>
+            <a:off x="762000" y="1690689"/>
+            <a:ext cx="7139472" cy="2604943"/>
+          </a:xfrm>
+          <a:prstGeom prst="rect">
+            <a:avLst/>
+          </a:prstGeom>
+        </p:spPr>
+      </p:pic>
+      <p:sp>
+        <p:nvSpPr>
+          <p:cNvPr id="2" name="Title 1"/>
+          <p:cNvSpPr>
+            <a:spLocks noGrp="1"/>
+          </p:cNvSpPr>
+          <p:nvPr>
+            <p:ph type="title"/>
+          </p:nvPr>
+        </p:nvSpPr>
+        <p:spPr/>
+        <p:txBody>
+          <a:bodyPr/>
+          <a:lstStyle/>
+          <a:p>
+            <a:r>
+              <a:rPr lang="en-US" dirty="0" smtClean="0"/>
+              <a:t>Basics of MVC – </a:t>
+            </a:r>
+            <a:r>
+              <a:rPr lang="en-US" dirty="0" smtClean="0"/>
+              <a:t>Validation and Scaffolding</a:t>
+            </a:r>
+            <a:endParaRPr lang="en-US" dirty="0"/>
+          </a:p>
+        </p:txBody>
+      </p:sp>
+      <p:sp>
+        <p:nvSpPr>
+          <p:cNvPr id="16" name="Subtitle 2"/>
+          <p:cNvSpPr txBox="1">
+            <a:spLocks/>
+          </p:cNvSpPr>
+          <p:nvPr/>
+        </p:nvSpPr>
+        <p:spPr>
+          <a:xfrm>
+            <a:off x="457200" y="1219200"/>
+            <a:ext cx="8229600" cy="5105400"/>
+          </a:xfrm>
+          <a:prstGeom prst="rect">
+            <a:avLst/>
+          </a:prstGeom>
+        </p:spPr>
+        <p:txBody>
+          <a:bodyPr vert="horz" lIns="182880" tIns="91440">
+            <a:normAutofit/>
+          </a:bodyPr>
+          <a:lstStyle/>
+          <a:p>
+            <a:pPr marL="265176" indent="-265176">
+              <a:lnSpc>
+                <a:spcPct val="200000"/>
+              </a:lnSpc>
+              <a:spcBef>
+                <a:spcPts val="250"/>
+              </a:spcBef>
+              <a:buClr>
+                <a:srgbClr val="FFC000"/>
+              </a:buClr>
+              <a:buSzPct val="80000"/>
+              <a:defRPr/>
+            </a:pPr>
+            <a:endParaRPr lang="en-US" sz="2800" b="1" dirty="0" smtClean="0">
+              <a:solidFill>
+                <a:srgbClr val="000000">
+                  <a:lumMod val="50000"/>
+                  <a:lumOff val="50000"/>
+                </a:srgbClr>
+              </a:solidFill>
+              <a:latin typeface="Trebuchet MS" pitchFamily="34" charset="0"/>
+            </a:endParaRPr>
+          </a:p>
+        </p:txBody>
+      </p:sp>
+      <p:sp>
+        <p:nvSpPr>
+          <p:cNvPr id="13" name="Right Arrow 12"/>
+          <p:cNvSpPr/>
+          <p:nvPr/>
+        </p:nvSpPr>
+        <p:spPr>
+          <a:xfrm rot="10800000">
+            <a:off x="2185086" y="2034818"/>
+            <a:ext cx="406483" cy="381000"/>
+          </a:xfrm>
+          <a:prstGeom prst="rightArrow">
+            <a:avLst/>
+          </a:prstGeom>
+        </p:spPr>
+        <p:style>
+          <a:lnRef idx="2">
+            <a:schemeClr val="accent1">
+              <a:shade val="50000"/>
+            </a:schemeClr>
+          </a:lnRef>
+          <a:fillRef idx="1">
+            <a:schemeClr val="accent1"/>
+          </a:fillRef>
+          <a:effectRef idx="0">
+            <a:schemeClr val="accent1"/>
+          </a:effectRef>
+          <a:fontRef idx="minor">
+            <a:schemeClr val="lt1"/>
+          </a:fontRef>
+        </p:style>
+        <p:txBody>
+          <a:bodyPr rtlCol="0" anchor="ctr"/>
+          <a:lstStyle/>
+          <a:p>
+            <a:pPr algn="ctr"/>
+            <a:endParaRPr lang="en-US">
+              <a:solidFill>
+                <a:schemeClr val="tx1"/>
+              </a:solidFill>
+            </a:endParaRPr>
+          </a:p>
+        </p:txBody>
+      </p:sp>
+      <p:sp>
+        <p:nvSpPr>
+          <p:cNvPr id="14" name="Right Arrow 13"/>
+          <p:cNvSpPr/>
+          <p:nvPr/>
+        </p:nvSpPr>
+        <p:spPr>
+          <a:xfrm rot="10800000">
+            <a:off x="2185086" y="2894113"/>
+            <a:ext cx="406483" cy="381000"/>
+          </a:xfrm>
+          <a:prstGeom prst="rightArrow">
+            <a:avLst/>
+          </a:prstGeom>
+        </p:spPr>
+        <p:style>
+          <a:lnRef idx="2">
+            <a:schemeClr val="accent1">
+              <a:shade val="50000"/>
+            </a:schemeClr>
+          </a:lnRef>
+          <a:fillRef idx="1">
+            <a:schemeClr val="accent1"/>
+          </a:fillRef>
+          <a:effectRef idx="0">
+            <a:schemeClr val="accent1"/>
+          </a:effectRef>
+          <a:fontRef idx="minor">
+            <a:schemeClr val="lt1"/>
+          </a:fontRef>
+        </p:style>
+        <p:txBody>
+          <a:bodyPr rtlCol="0" anchor="ctr"/>
+          <a:lstStyle/>
+          <a:p>
+            <a:pPr algn="ctr"/>
+            <a:endParaRPr lang="en-US">
+              <a:solidFill>
+                <a:schemeClr val="tx1"/>
+              </a:solidFill>
+            </a:endParaRPr>
+          </a:p>
+        </p:txBody>
+      </p:sp>
+      <p:sp>
+        <p:nvSpPr>
+          <p:cNvPr id="15" name="Right Arrow 14"/>
+          <p:cNvSpPr/>
+          <p:nvPr/>
+        </p:nvSpPr>
+        <p:spPr>
+          <a:xfrm rot="10800000">
+            <a:off x="4092913" y="2241794"/>
+            <a:ext cx="406483" cy="381000"/>
+          </a:xfrm>
+          <a:prstGeom prst="rightArrow">
+            <a:avLst/>
+          </a:prstGeom>
+        </p:spPr>
+        <p:style>
+          <a:lnRef idx="2">
+            <a:schemeClr val="accent1">
+              <a:shade val="50000"/>
+            </a:schemeClr>
+          </a:lnRef>
+          <a:fillRef idx="1">
+            <a:schemeClr val="accent1"/>
+          </a:fillRef>
+          <a:effectRef idx="0">
+            <a:schemeClr val="accent1"/>
+          </a:effectRef>
+          <a:fontRef idx="minor">
+            <a:schemeClr val="lt1"/>
+          </a:fontRef>
+        </p:style>
+        <p:txBody>
+          <a:bodyPr rtlCol="0" anchor="ctr"/>
+          <a:lstStyle/>
+          <a:p>
+            <a:pPr algn="ctr"/>
+            <a:endParaRPr lang="en-US">
+              <a:solidFill>
+                <a:schemeClr val="tx1"/>
+              </a:solidFill>
+            </a:endParaRPr>
+          </a:p>
+        </p:txBody>
+      </p:sp>
+      <p:sp>
+        <p:nvSpPr>
+          <p:cNvPr id="17" name="Right Arrow 16"/>
+          <p:cNvSpPr/>
+          <p:nvPr/>
+        </p:nvSpPr>
+        <p:spPr>
+          <a:xfrm rot="10800000">
+            <a:off x="4008476" y="3107267"/>
+            <a:ext cx="406483" cy="381000"/>
+          </a:xfrm>
+          <a:prstGeom prst="rightArrow">
+            <a:avLst/>
+          </a:prstGeom>
+        </p:spPr>
+        <p:style>
+          <a:lnRef idx="2">
+            <a:schemeClr val="accent1">
+              <a:shade val="50000"/>
+            </a:schemeClr>
+          </a:lnRef>
+          <a:fillRef idx="1">
+            <a:schemeClr val="accent1"/>
+          </a:fillRef>
+          <a:effectRef idx="0">
+            <a:schemeClr val="accent1"/>
+          </a:effectRef>
+          <a:fontRef idx="minor">
+            <a:schemeClr val="lt1"/>
+          </a:fontRef>
+        </p:style>
+        <p:txBody>
+          <a:bodyPr rtlCol="0" anchor="ctr"/>
+          <a:lstStyle/>
+          <a:p>
+            <a:pPr algn="ctr"/>
+            <a:endParaRPr lang="en-US">
+              <a:solidFill>
+                <a:schemeClr val="tx1"/>
+              </a:solidFill>
+            </a:endParaRPr>
+          </a:p>
+        </p:txBody>
+      </p:sp>
+    </p:spTree>
+    <p:extLst>
+      <p:ext uri="{BB962C8B-B14F-4D97-AF65-F5344CB8AC3E}">
+        <p14:creationId xmlns:p14="http://schemas.microsoft.com/office/powerpoint/2010/main" val="1470346319"/>
+      </p:ext>
+    </p:extLst>
+  </p:cSld>
+  <p:clrMapOvr>
+    <a:masterClrMapping/>
+  </p:clrMapOvr>
+  <p:transition>
+    <p:fade/>
+  </p:transition>
+  <p:timing>
+    <p:tnLst>
+      <p:par>
+        <p:cTn id="1" dur="indefinite" restart="never" nodeType="tmRoot">
+          <p:childTnLst>
+            <p:seq concurrent="1" nextAc="seek">
+              <p:cTn id="2" dur="indefinite" nodeType="mainSeq">
+                <p:childTnLst>
+                  <p:par>
+                    <p:cTn id="3" fill="hold">
+                      <p:stCondLst>
+                        <p:cond delay="indefinite"/>
+                      </p:stCondLst>
+                      <p:childTnLst>
+                        <p:par>
+                          <p:cTn id="4" fill="hold">
+                            <p:stCondLst>
+                              <p:cond delay="0"/>
+                            </p:stCondLst>
+                            <p:childTnLst>
+                              <p:par>
+                                <p:cTn id="5" presetID="4" presetClass="entr" presetSubtype="16" fill="hold" grpId="0" nodeType="clickEffect">
+                                  <p:stCondLst>
+                                    <p:cond delay="0"/>
+                                  </p:stCondLst>
+                                  <p:childTnLst>
+                                    <p:set>
+                                      <p:cBhvr>
+                                        <p:cTn id="6" dur="1" fill="hold">
+                                          <p:stCondLst>
+                                            <p:cond delay="0"/>
+                                          </p:stCondLst>
+                                        </p:cTn>
+                                        <p:tgtEl>
+                                          <p:spTgt spid="13"/>
+                                        </p:tgtEl>
+                                        <p:attrNameLst>
+                                          <p:attrName>style.visibility</p:attrName>
+                                        </p:attrNameLst>
+                                      </p:cBhvr>
+                                      <p:to>
+                                        <p:strVal val="visible"/>
+                                      </p:to>
+                                    </p:set>
+                                    <p:animEffect transition="in" filter="box(in)">
+                                      <p:cBhvr>
+                                        <p:cTn id="7" dur="500"/>
+                                        <p:tgtEl>
+                                          <p:spTgt spid="13"/>
+                                        </p:tgtEl>
+                                      </p:cBhvr>
+                                    </p:animEffect>
+                                  </p:childTnLst>
+                                </p:cTn>
+                              </p:par>
+                              <p:par>
+                                <p:cTn id="8" presetID="4" presetClass="entr" presetSubtype="16" fill="hold" grpId="0" nodeType="withEffect">
+                                  <p:stCondLst>
+                                    <p:cond delay="0"/>
+                                  </p:stCondLst>
+                                  <p:childTnLst>
+                                    <p:set>
+                                      <p:cBhvr>
+                                        <p:cTn id="9" dur="1" fill="hold">
+                                          <p:stCondLst>
+                                            <p:cond delay="0"/>
+                                          </p:stCondLst>
+                                        </p:cTn>
+                                        <p:tgtEl>
+                                          <p:spTgt spid="14"/>
+                                        </p:tgtEl>
+                                        <p:attrNameLst>
+                                          <p:attrName>style.visibility</p:attrName>
+                                        </p:attrNameLst>
+                                      </p:cBhvr>
+                                      <p:to>
+                                        <p:strVal val="visible"/>
+                                      </p:to>
+                                    </p:set>
+                                    <p:animEffect transition="in" filter="box(in)">
+                                      <p:cBhvr>
+                                        <p:cTn id="10" dur="500"/>
+                                        <p:tgtEl>
+                                          <p:spTgt spid="14"/>
+                                        </p:tgtEl>
+                                      </p:cBhvr>
+                                    </p:animEffect>
+                                  </p:childTnLst>
+                                </p:cTn>
+                              </p:par>
+                            </p:childTnLst>
+                          </p:cTn>
+                        </p:par>
+                      </p:childTnLst>
+                    </p:cTn>
+                  </p:par>
+                  <p:par>
+                    <p:cTn id="11" fill="hold">
+                      <p:stCondLst>
+                        <p:cond delay="indefinite"/>
+                      </p:stCondLst>
+                      <p:childTnLst>
+                        <p:par>
+                          <p:cTn id="12" fill="hold">
+                            <p:stCondLst>
+                              <p:cond delay="0"/>
+                            </p:stCondLst>
+                            <p:childTnLst>
+                              <p:par>
+                                <p:cTn id="13" presetID="4" presetClass="entr" presetSubtype="16" fill="hold" grpId="0" nodeType="clickEffect">
+                                  <p:stCondLst>
+                                    <p:cond delay="0"/>
+                                  </p:stCondLst>
+                                  <p:childTnLst>
+                                    <p:set>
+                                      <p:cBhvr>
+                                        <p:cTn id="14" dur="1" fill="hold">
+                                          <p:stCondLst>
+                                            <p:cond delay="0"/>
+                                          </p:stCondLst>
+                                        </p:cTn>
+                                        <p:tgtEl>
+                                          <p:spTgt spid="15"/>
+                                        </p:tgtEl>
+                                        <p:attrNameLst>
+                                          <p:attrName>style.visibility</p:attrName>
+                                        </p:attrNameLst>
+                                      </p:cBhvr>
+                                      <p:to>
+                                        <p:strVal val="visible"/>
+                                      </p:to>
+                                    </p:set>
+                                    <p:animEffect transition="in" filter="box(in)">
+                                      <p:cBhvr>
+                                        <p:cTn id="15" dur="500"/>
+                                        <p:tgtEl>
+                                          <p:spTgt spid="15"/>
+                                        </p:tgtEl>
+                                      </p:cBhvr>
+                                    </p:animEffect>
+                                  </p:childTnLst>
+                                </p:cTn>
+                              </p:par>
+                              <p:par>
+                                <p:cTn id="16" presetID="4" presetClass="entr" presetSubtype="16" fill="hold" grpId="0" nodeType="withEffect">
+                                  <p:stCondLst>
+                                    <p:cond delay="0"/>
+                                  </p:stCondLst>
+                                  <p:childTnLst>
+                                    <p:set>
+                                      <p:cBhvr>
+                                        <p:cTn id="17" dur="1" fill="hold">
+                                          <p:stCondLst>
+                                            <p:cond delay="0"/>
+                                          </p:stCondLst>
+                                        </p:cTn>
+                                        <p:tgtEl>
+                                          <p:spTgt spid="17"/>
+                                        </p:tgtEl>
+                                        <p:attrNameLst>
+                                          <p:attrName>style.visibility</p:attrName>
+                                        </p:attrNameLst>
+                                      </p:cBhvr>
+                                      <p:to>
+                                        <p:strVal val="visible"/>
+                                      </p:to>
+                                    </p:set>
+                                    <p:animEffect transition="in" filter="box(in)">
+                                      <p:cBhvr>
+                                        <p:cTn id="18" dur="500"/>
+                                        <p:tgtEl>
+                                          <p:spTgt spid="17"/>
+                                        </p:tgtEl>
+                                      </p:cBhvr>
+                                    </p:animEffect>
+                                  </p:childTnLst>
+                                </p:cTn>
+                              </p:par>
+                            </p:childTnLst>
+                          </p:cTn>
+                        </p:par>
+                      </p:childTnLst>
+                    </p:cTn>
+                  </p:par>
+                </p:childTnLst>
+              </p:cTn>
+              <p:prevCondLst>
+                <p:cond evt="onPrev" delay="0">
+                  <p:tgtEl>
+                    <p:sldTgt/>
+                  </p:tgtEl>
+                </p:cond>
+              </p:prevCondLst>
+              <p:nextCondLst>
+                <p:cond evt="onNext" delay="0">
+                  <p:tgtEl>
+                    <p:sldTgt/>
+                  </p:tgtEl>
+                </p:cond>
+              </p:nextCondLst>
+            </p:seq>
+          </p:childTnLst>
+        </p:cTn>
+      </p:par>
+    </p:tnLst>
+    <p:bldLst>
+      <p:bldP spid="13" grpId="0" animBg="1"/>
+      <p:bldP spid="14" grpId="0" animBg="1"/>
+      <p:bldP spid="15" grpId="0" animBg="1"/>
+      <p:bldP spid="17" grpId="0" animBg="1"/>
+    </p:bldLst>
+  </p:timing>
+</p:sld>
+</file>
+
+<file path=ppt/slides/slide19.xml><?xml version="1.0" encoding="utf-8"?>
+<p:sld xmlns:a="http://schemas.openxmlformats.org/drawingml/2006/main" xmlns:r="http://schemas.openxmlformats.org/officeDocument/2006/relationships" xmlns:p="http://schemas.openxmlformats.org/presentationml/2006/main">
+  <p:cSld>
+    <p:spTree>
+      <p:nvGrpSpPr>
+        <p:cNvPr id="1" name=""/>
+        <p:cNvGrpSpPr/>
+        <p:nvPr/>
+      </p:nvGrpSpPr>
+      <p:grpSpPr>
+        <a:xfrm>
+          <a:off x="0" y="0"/>
+          <a:ext cx="0" cy="0"/>
+          <a:chOff x="0" y="0"/>
+          <a:chExt cx="0" cy="0"/>
+        </a:xfrm>
+      </p:grpSpPr>
       <p:sp>
         <p:nvSpPr>
           <p:cNvPr id="2" name="Title 1"/>
@@ -6924,8 +8218,8 @@
         </p:blipFill>
         <p:spPr>
           <a:xfrm>
-            <a:off x="490853" y="2652585"/>
-            <a:ext cx="3690185" cy="683740"/>
+            <a:off x="381000" y="2652584"/>
+            <a:ext cx="4190357" cy="776415"/>
           </a:xfrm>
           <a:prstGeom prst="rect">
             <a:avLst/>
@@ -6950,8 +8244,8 @@
         </p:blipFill>
         <p:spPr>
           <a:xfrm>
-            <a:off x="4549860" y="2386045"/>
-            <a:ext cx="3965489" cy="966755"/>
+            <a:off x="4379383" y="2285999"/>
+            <a:ext cx="4688417" cy="1142999"/>
           </a:xfrm>
           <a:prstGeom prst="rect">
             <a:avLst/>
@@ -6968,8 +8262,8 @@
         </p:nvSpPr>
         <p:spPr>
           <a:xfrm>
-            <a:off x="457200" y="1825625"/>
-            <a:ext cx="4114800" cy="4351338"/>
+            <a:off x="304800" y="1825625"/>
+            <a:ext cx="4267200" cy="4351338"/>
           </a:xfrm>
           <a:prstGeom prst="rect">
             <a:avLst/>
@@ -7165,8 +8459,8 @@
         </p:nvSpPr>
         <p:spPr>
           <a:xfrm>
-            <a:off x="4514850" y="1825625"/>
-            <a:ext cx="4000500" cy="4351338"/>
+            <a:off x="4379383" y="1825625"/>
+            <a:ext cx="4135967" cy="4351338"/>
           </a:xfrm>
           <a:prstGeom prst="rect">
             <a:avLst/>
@@ -7375,474 +8669,6 @@
 </p:sld>
 </file>
 
-<file path=ppt/slides/slide19.xml><?xml version="1.0" encoding="utf-8"?>
-<p:sld xmlns:a="http://schemas.openxmlformats.org/drawingml/2006/main" xmlns:r="http://schemas.openxmlformats.org/officeDocument/2006/relationships" xmlns:p="http://schemas.openxmlformats.org/presentationml/2006/main">
-  <p:cSld>
-    <p:spTree>
-      <p:nvGrpSpPr>
-        <p:cNvPr id="1" name=""/>
-        <p:cNvGrpSpPr/>
-        <p:nvPr/>
-      </p:nvGrpSpPr>
-      <p:grpSpPr>
-        <a:xfrm>
-          <a:off x="0" y="0"/>
-          <a:ext cx="0" cy="0"/>
-          <a:chOff x="0" y="0"/>
-          <a:chExt cx="0" cy="0"/>
-        </a:xfrm>
-      </p:grpSpPr>
-      <p:pic>
-        <p:nvPicPr>
-          <p:cNvPr id="2050" name="Picture 2"/>
-          <p:cNvPicPr>
-            <a:picLocks noChangeAspect="1" noChangeArrowheads="1"/>
-          </p:cNvPicPr>
-          <p:nvPr/>
-        </p:nvPicPr>
-        <p:blipFill>
-          <a:blip r:embed="rId3">
-            <a:extLst>
-              <a:ext uri="{28A0092B-C50C-407E-A947-70E740481C1C}">
-                <a14:useLocalDpi xmlns:a14="http://schemas.microsoft.com/office/drawing/2010/main" val="0"/>
-              </a:ext>
-            </a:extLst>
-          </a:blip>
-          <a:srcRect/>
-          <a:stretch>
-            <a:fillRect/>
-          </a:stretch>
-        </p:blipFill>
-        <p:spPr bwMode="auto">
-          <a:xfrm>
-            <a:off x="2228112" y="2102370"/>
-            <a:ext cx="4982759" cy="2447925"/>
-          </a:xfrm>
-          <a:prstGeom prst="rect">
-            <a:avLst/>
-          </a:prstGeom>
-          <a:noFill/>
-          <a:ln>
-            <a:noFill/>
-          </a:ln>
-          <a:effectLst/>
-          <a:extLst>
-            <a:ext uri="{909E8E84-426E-40DD-AFC4-6F175D3DCCD1}">
-              <a14:hiddenFill xmlns:a14="http://schemas.microsoft.com/office/drawing/2010/main">
-                <a:solidFill>
-                  <a:schemeClr val="accent1"/>
-                </a:solidFill>
-              </a14:hiddenFill>
-            </a:ext>
-            <a:ext uri="{91240B29-F687-4F45-9708-019B960494DF}">
-              <a14:hiddenLine xmlns:a14="http://schemas.microsoft.com/office/drawing/2010/main" w="9525">
-                <a:solidFill>
-                  <a:schemeClr val="tx1"/>
-                </a:solidFill>
-                <a:miter lim="800000"/>
-                <a:headEnd/>
-                <a:tailEnd/>
-              </a14:hiddenLine>
-            </a:ext>
-            <a:ext uri="{AF507438-7753-43E0-B8FC-AC1667EBCBE1}">
-              <a14:hiddenEffects xmlns:a14="http://schemas.microsoft.com/office/drawing/2010/main">
-                <a:effectLst>
-                  <a:outerShdw dist="35921" dir="2700000" algn="ctr" rotWithShape="0">
-                    <a:schemeClr val="bg2"/>
-                  </a:outerShdw>
-                </a:effectLst>
-              </a14:hiddenEffects>
-            </a:ext>
-          </a:extLst>
-        </p:spPr>
-      </p:pic>
-      <p:sp>
-        <p:nvSpPr>
-          <p:cNvPr id="2" name="Title 1"/>
-          <p:cNvSpPr>
-            <a:spLocks noGrp="1"/>
-          </p:cNvSpPr>
-          <p:nvPr>
-            <p:ph type="title"/>
-          </p:nvPr>
-        </p:nvSpPr>
-        <p:spPr/>
-        <p:txBody>
-          <a:bodyPr/>
-          <a:lstStyle/>
-          <a:p>
-            <a:r>
-              <a:rPr lang="en-US" dirty="0" smtClean="0"/>
-              <a:t>Basics of MVC – Validation</a:t>
-            </a:r>
-            <a:endParaRPr lang="en-US" dirty="0"/>
-          </a:p>
-        </p:txBody>
-      </p:sp>
-      <p:sp>
-        <p:nvSpPr>
-          <p:cNvPr id="16" name="Subtitle 2"/>
-          <p:cNvSpPr txBox="1">
-            <a:spLocks/>
-          </p:cNvSpPr>
-          <p:nvPr/>
-        </p:nvSpPr>
-        <p:spPr>
-          <a:xfrm>
-            <a:off x="457200" y="1219200"/>
-            <a:ext cx="8229600" cy="5105400"/>
-          </a:xfrm>
-          <a:prstGeom prst="rect">
-            <a:avLst/>
-          </a:prstGeom>
-        </p:spPr>
-        <p:txBody>
-          <a:bodyPr vert="horz" lIns="182880" tIns="91440">
-            <a:normAutofit/>
-          </a:bodyPr>
-          <a:lstStyle/>
-          <a:p>
-            <a:pPr marL="265176" indent="-265176">
-              <a:lnSpc>
-                <a:spcPct val="200000"/>
-              </a:lnSpc>
-              <a:spcBef>
-                <a:spcPts val="250"/>
-              </a:spcBef>
-              <a:buClr>
-                <a:srgbClr val="FFC000"/>
-              </a:buClr>
-              <a:buSzPct val="80000"/>
-              <a:defRPr/>
-            </a:pPr>
-            <a:endParaRPr lang="en-US" sz="2800" b="1" dirty="0" smtClean="0">
-              <a:solidFill>
-                <a:srgbClr val="000000">
-                  <a:lumMod val="50000"/>
-                  <a:lumOff val="50000"/>
-                </a:srgbClr>
-              </a:solidFill>
-              <a:latin typeface="Trebuchet MS" pitchFamily="34" charset="0"/>
-            </a:endParaRPr>
-          </a:p>
-        </p:txBody>
-      </p:sp>
-      <p:cxnSp>
-        <p:nvCxnSpPr>
-          <p:cNvPr id="9" name="Straight Connector 8"/>
-          <p:cNvCxnSpPr/>
-          <p:nvPr/>
-        </p:nvCxnSpPr>
-        <p:spPr>
-          <a:xfrm>
-            <a:off x="2362200" y="2438400"/>
-            <a:ext cx="1447800" cy="0"/>
-          </a:xfrm>
-          <a:prstGeom prst="line">
-            <a:avLst/>
-          </a:prstGeom>
-          <a:ln w="38100">
-            <a:solidFill>
-              <a:schemeClr val="accent1">
-                <a:lumMod val="50000"/>
-              </a:schemeClr>
-            </a:solidFill>
-          </a:ln>
-        </p:spPr>
-        <p:style>
-          <a:lnRef idx="1">
-            <a:schemeClr val="accent1"/>
-          </a:lnRef>
-          <a:fillRef idx="0">
-            <a:schemeClr val="accent1"/>
-          </a:fillRef>
-          <a:effectRef idx="0">
-            <a:schemeClr val="accent1"/>
-          </a:effectRef>
-          <a:fontRef idx="minor">
-            <a:schemeClr val="tx1"/>
-          </a:fontRef>
-        </p:style>
-      </p:cxnSp>
-      <p:cxnSp>
-        <p:nvCxnSpPr>
-          <p:cNvPr id="12" name="Straight Connector 11"/>
-          <p:cNvCxnSpPr/>
-          <p:nvPr/>
-        </p:nvCxnSpPr>
-        <p:spPr>
-          <a:xfrm>
-            <a:off x="2400300" y="3291840"/>
-            <a:ext cx="1409700" cy="0"/>
-          </a:xfrm>
-          <a:prstGeom prst="line">
-            <a:avLst/>
-          </a:prstGeom>
-          <a:ln w="38100">
-            <a:solidFill>
-              <a:schemeClr val="accent1">
-                <a:lumMod val="50000"/>
-              </a:schemeClr>
-            </a:solidFill>
-          </a:ln>
-        </p:spPr>
-        <p:style>
-          <a:lnRef idx="1">
-            <a:schemeClr val="accent1"/>
-          </a:lnRef>
-          <a:fillRef idx="0">
-            <a:schemeClr val="accent1"/>
-          </a:fillRef>
-          <a:effectRef idx="0">
-            <a:schemeClr val="accent1"/>
-          </a:effectRef>
-          <a:fontRef idx="minor">
-            <a:schemeClr val="tx1"/>
-          </a:fontRef>
-        </p:style>
-      </p:cxnSp>
-      <p:cxnSp>
-        <p:nvCxnSpPr>
-          <p:cNvPr id="20" name="Straight Connector 19"/>
-          <p:cNvCxnSpPr/>
-          <p:nvPr/>
-        </p:nvCxnSpPr>
-        <p:spPr>
-          <a:xfrm>
-            <a:off x="2400300" y="4168140"/>
-            <a:ext cx="1409700" cy="0"/>
-          </a:xfrm>
-          <a:prstGeom prst="line">
-            <a:avLst/>
-          </a:prstGeom>
-          <a:ln w="38100">
-            <a:solidFill>
-              <a:schemeClr val="accent1">
-                <a:lumMod val="50000"/>
-              </a:schemeClr>
-            </a:solidFill>
-          </a:ln>
-        </p:spPr>
-        <p:style>
-          <a:lnRef idx="1">
-            <a:schemeClr val="accent1"/>
-          </a:lnRef>
-          <a:fillRef idx="0">
-            <a:schemeClr val="accent1"/>
-          </a:fillRef>
-          <a:effectRef idx="0">
-            <a:schemeClr val="accent1"/>
-          </a:effectRef>
-          <a:fontRef idx="minor">
-            <a:schemeClr val="tx1"/>
-          </a:fontRef>
-        </p:style>
-      </p:cxnSp>
-    </p:spTree>
-    <p:extLst>
-      <p:ext uri="{BB962C8B-B14F-4D97-AF65-F5344CB8AC3E}">
-        <p14:creationId xmlns:p14="http://schemas.microsoft.com/office/powerpoint/2010/main" val="1470346319"/>
-      </p:ext>
-    </p:extLst>
-  </p:cSld>
-  <p:clrMapOvr>
-    <a:masterClrMapping/>
-  </p:clrMapOvr>
-  <p:transition>
-    <p:fade/>
-  </p:transition>
-  <p:timing>
-    <p:tnLst>
-      <p:par>
-        <p:cTn id="1" dur="indefinite" restart="never" nodeType="tmRoot">
-          <p:childTnLst>
-            <p:seq concurrent="1" nextAc="seek">
-              <p:cTn id="2" dur="indefinite" nodeType="mainSeq">
-                <p:childTnLst>
-                  <p:par>
-                    <p:cTn id="3" fill="hold">
-                      <p:stCondLst>
-                        <p:cond delay="indefinite"/>
-                      </p:stCondLst>
-                      <p:childTnLst>
-                        <p:par>
-                          <p:cTn id="4" fill="hold">
-                            <p:stCondLst>
-                              <p:cond delay="0"/>
-                            </p:stCondLst>
-                            <p:childTnLst>
-                              <p:par>
-                                <p:cTn id="5" presetID="10" presetClass="entr" presetSubtype="0" fill="hold" nodeType="clickEffect">
-                                  <p:stCondLst>
-                                    <p:cond delay="0"/>
-                                  </p:stCondLst>
-                                  <p:childTnLst>
-                                    <p:set>
-                                      <p:cBhvr>
-                                        <p:cTn id="6" dur="1" fill="hold">
-                                          <p:stCondLst>
-                                            <p:cond delay="0"/>
-                                          </p:stCondLst>
-                                        </p:cTn>
-                                        <p:tgtEl>
-                                          <p:spTgt spid="9"/>
-                                        </p:tgtEl>
-                                        <p:attrNameLst>
-                                          <p:attrName>style.visibility</p:attrName>
-                                        </p:attrNameLst>
-                                      </p:cBhvr>
-                                      <p:to>
-                                        <p:strVal val="visible"/>
-                                      </p:to>
-                                    </p:set>
-                                    <p:animEffect transition="in" filter="fade">
-                                      <p:cBhvr>
-                                        <p:cTn id="7" dur="500"/>
-                                        <p:tgtEl>
-                                          <p:spTgt spid="9"/>
-                                        </p:tgtEl>
-                                      </p:cBhvr>
-                                    </p:animEffect>
-                                  </p:childTnLst>
-                                </p:cTn>
-                              </p:par>
-                            </p:childTnLst>
-                          </p:cTn>
-                        </p:par>
-                      </p:childTnLst>
-                    </p:cTn>
-                  </p:par>
-                  <p:par>
-                    <p:cTn id="8" fill="hold">
-                      <p:stCondLst>
-                        <p:cond delay="indefinite"/>
-                      </p:stCondLst>
-                      <p:childTnLst>
-                        <p:par>
-                          <p:cTn id="9" fill="hold">
-                            <p:stCondLst>
-                              <p:cond delay="0"/>
-                            </p:stCondLst>
-                            <p:childTnLst>
-                              <p:par>
-                                <p:cTn id="10" presetID="10" presetClass="entr" presetSubtype="0" fill="hold" nodeType="clickEffect">
-                                  <p:stCondLst>
-                                    <p:cond delay="0"/>
-                                  </p:stCondLst>
-                                  <p:childTnLst>
-                                    <p:set>
-                                      <p:cBhvr>
-                                        <p:cTn id="11" dur="1" fill="hold">
-                                          <p:stCondLst>
-                                            <p:cond delay="0"/>
-                                          </p:stCondLst>
-                                        </p:cTn>
-                                        <p:tgtEl>
-                                          <p:spTgt spid="12"/>
-                                        </p:tgtEl>
-                                        <p:attrNameLst>
-                                          <p:attrName>style.visibility</p:attrName>
-                                        </p:attrNameLst>
-                                      </p:cBhvr>
-                                      <p:to>
-                                        <p:strVal val="visible"/>
-                                      </p:to>
-                                    </p:set>
-                                    <p:animEffect transition="in" filter="fade">
-                                      <p:cBhvr>
-                                        <p:cTn id="12" dur="500"/>
-                                        <p:tgtEl>
-                                          <p:spTgt spid="12"/>
-                                        </p:tgtEl>
-                                      </p:cBhvr>
-                                    </p:animEffect>
-                                  </p:childTnLst>
-                                </p:cTn>
-                              </p:par>
-                            </p:childTnLst>
-                          </p:cTn>
-                        </p:par>
-                      </p:childTnLst>
-                    </p:cTn>
-                  </p:par>
-                  <p:par>
-                    <p:cTn id="13" fill="hold">
-                      <p:stCondLst>
-                        <p:cond delay="indefinite"/>
-                      </p:stCondLst>
-                      <p:childTnLst>
-                        <p:par>
-                          <p:cTn id="14" fill="hold">
-                            <p:stCondLst>
-                              <p:cond delay="0"/>
-                            </p:stCondLst>
-                            <p:childTnLst>
-                              <p:par>
-                                <p:cTn id="15" presetID="10" presetClass="entr" presetSubtype="0" fill="hold" nodeType="clickEffect">
-                                  <p:stCondLst>
-                                    <p:cond delay="0"/>
-                                  </p:stCondLst>
-                                  <p:childTnLst>
-                                    <p:set>
-                                      <p:cBhvr>
-                                        <p:cTn id="16" dur="1" fill="hold">
-                                          <p:stCondLst>
-                                            <p:cond delay="0"/>
-                                          </p:stCondLst>
-                                        </p:cTn>
-                                        <p:tgtEl>
-                                          <p:spTgt spid="20"/>
-                                        </p:tgtEl>
-                                        <p:attrNameLst>
-                                          <p:attrName>style.visibility</p:attrName>
-                                        </p:attrNameLst>
-                                      </p:cBhvr>
-                                      <p:to>
-                                        <p:strVal val="visible"/>
-                                      </p:to>
-                                    </p:set>
-                                    <p:animEffect transition="in" filter="fade">
-                                      <p:cBhvr>
-                                        <p:cTn id="17" dur="500"/>
-                                        <p:tgtEl>
-                                          <p:spTgt spid="20"/>
-                                        </p:tgtEl>
-                                      </p:cBhvr>
-                                    </p:animEffect>
-                                  </p:childTnLst>
-                                </p:cTn>
-                              </p:par>
-                            </p:childTnLst>
-                          </p:cTn>
-                        </p:par>
-                      </p:childTnLst>
-                    </p:cTn>
-                  </p:par>
-                </p:childTnLst>
-              </p:cTn>
-              <p:prevCondLst>
-                <p:cond evt="onPrev" delay="0">
-                  <p:tgtEl>
-                    <p:sldTgt/>
-                  </p:tgtEl>
-                </p:cond>
-              </p:prevCondLst>
-              <p:nextCondLst>
-                <p:cond evt="onNext" delay="0">
-                  <p:tgtEl>
-                    <p:sldTgt/>
-                  </p:tgtEl>
-                </p:cond>
-              </p:nextCondLst>
-            </p:seq>
-          </p:childTnLst>
-        </p:cTn>
-      </p:par>
-    </p:tnLst>
-  </p:timing>
-</p:sld>
-</file>
-
 <file path=ppt/slides/slide2.xml><?xml version="1.0" encoding="utf-8"?>
 <p:sld xmlns:a="http://schemas.openxmlformats.org/drawingml/2006/main" xmlns:r="http://schemas.openxmlformats.org/officeDocument/2006/relationships" xmlns:p="http://schemas.openxmlformats.org/presentationml/2006/main">
   <p:cSld>
@@ -7902,7 +8728,23 @@
           <a:p>
             <a:r>
               <a:rPr lang="en-US" sz="2400" dirty="0" smtClean="0"/>
-              <a:t>Where do MVC and Web API fit in today’s web?</a:t>
+              <a:t>Where </a:t>
+            </a:r>
+            <a:r>
+              <a:rPr lang="en-US" sz="2400" dirty="0" smtClean="0"/>
+              <a:t>does </a:t>
+            </a:r>
+            <a:r>
+              <a:rPr lang="en-US" sz="2400" dirty="0" smtClean="0"/>
+              <a:t>MVC </a:t>
+            </a:r>
+            <a:r>
+              <a:rPr lang="en-US" sz="2400" dirty="0" smtClean="0"/>
+              <a:t>fit </a:t>
+            </a:r>
+            <a:r>
+              <a:rPr lang="en-US" sz="2400" dirty="0" smtClean="0"/>
+              <a:t>in today’s web?</a:t>
             </a:r>
           </a:p>
           <a:p>
@@ -7911,7 +8753,49 @@
           <a:p>
             <a:r>
               <a:rPr lang="en-US" sz="2400" dirty="0" smtClean="0"/>
-              <a:t>Basics of MVC</a:t>
+              <a:t>Basics of </a:t>
+            </a:r>
+            <a:r>
+              <a:rPr lang="en-US" sz="2400" dirty="0" smtClean="0"/>
+              <a:t>MVC</a:t>
+            </a:r>
+          </a:p>
+          <a:p>
+            <a:pPr lvl="1"/>
+            <a:r>
+              <a:rPr lang="en-US" dirty="0" smtClean="0"/>
+              <a:t>Routing</a:t>
+            </a:r>
+          </a:p>
+          <a:p>
+            <a:pPr lvl="1"/>
+            <a:r>
+              <a:rPr lang="en-US" dirty="0" smtClean="0"/>
+              <a:t>Views</a:t>
+            </a:r>
+          </a:p>
+          <a:p>
+            <a:pPr lvl="1"/>
+            <a:r>
+              <a:rPr lang="en-US" dirty="0" smtClean="0"/>
+              <a:t>Controllers/Actions</a:t>
+            </a:r>
+          </a:p>
+          <a:p>
+            <a:pPr lvl="1"/>
+            <a:r>
+              <a:rPr lang="en-US" dirty="0" smtClean="0"/>
+              <a:t>Models</a:t>
+            </a:r>
+          </a:p>
+          <a:p>
+            <a:pPr lvl="1"/>
+            <a:endParaRPr lang="en-US" sz="2400" dirty="0"/>
+          </a:p>
+          <a:p>
+            <a:r>
+              <a:rPr lang="en-US" sz="2400" dirty="0" smtClean="0"/>
+              <a:t>MVC: The good parts</a:t>
             </a:r>
           </a:p>
           <a:p>
@@ -7920,19 +8804,11 @@
           <a:p>
             <a:r>
               <a:rPr lang="en-US" sz="2400" dirty="0" smtClean="0"/>
-              <a:t>Basics of Web API</a:t>
-            </a:r>
-          </a:p>
-          <a:p>
-            <a:pPr marL="0" indent="0">
-              <a:buNone/>
-            </a:pPr>
-            <a:endParaRPr lang="en-US" sz="2400" dirty="0" smtClean="0"/>
-          </a:p>
-          <a:p>
+              <a:t>Is MVC a </a:t>
+            </a:r>
             <a:r>
               <a:rPr lang="en-US" sz="2400" dirty="0" smtClean="0"/>
-              <a:t>Are MVC or Web API a fit for your project?</a:t>
+              <a:t>fit for your project?</a:t>
             </a:r>
             <a:endParaRPr lang="en-US" sz="2400" dirty="0"/>
           </a:p>
@@ -7983,82 +8859,38 @@
             <p:ph type="title"/>
           </p:nvPr>
         </p:nvSpPr>
-        <p:spPr/>
-        <p:txBody>
-          <a:bodyPr/>
-          <a:lstStyle/>
-          <a:p>
-            <a:r>
-              <a:rPr lang="en-US" smtClean="0"/>
-              <a:t>What problem is MVC trying to solve?</a:t>
-            </a:r>
-            <a:endParaRPr lang="en-US" dirty="0"/>
-          </a:p>
-        </p:txBody>
-      </p:sp>
-      <p:sp>
-        <p:nvSpPr>
-          <p:cNvPr id="3" name="Subtitle 2"/>
-          <p:cNvSpPr>
-            <a:spLocks noGrp="1"/>
-          </p:cNvSpPr>
-          <p:nvPr>
-            <p:ph idx="1"/>
-          </p:nvPr>
-        </p:nvSpPr>
-        <p:spPr/>
+        <p:spPr>
+          <a:xfrm>
+            <a:off x="685800" y="2743200"/>
+            <a:ext cx="7886700" cy="1325563"/>
+          </a:xfrm>
+          <a:ln>
+            <a:noFill/>
+          </a:ln>
+        </p:spPr>
         <p:txBody>
           <a:bodyPr>
             <a:normAutofit/>
           </a:bodyPr>
           <a:lstStyle/>
           <a:p>
-            <a:pPr marL="0" indent="0">
-              <a:buNone/>
-            </a:pPr>
-            <a:r>
-              <a:rPr lang="en-US" sz="2400" dirty="0" smtClean="0"/>
-              <a:t>Problem: </a:t>
-            </a:r>
-            <a:r>
-              <a:rPr lang="en-US" sz="2400" dirty="0" smtClean="0">
-                <a:solidFill>
-                  <a:srgbClr val="0070C0"/>
-                </a:solidFill>
-              </a:rPr>
-              <a:t>No Separation of Concerns guidance</a:t>
-            </a:r>
-          </a:p>
-          <a:p>
-            <a:endParaRPr lang="en-US" sz="2400" dirty="0" smtClean="0"/>
-          </a:p>
-          <a:p>
-            <a:r>
-              <a:rPr lang="en-US" sz="2400" dirty="0" smtClean="0"/>
-              <a:t>Don’t just dump all your code in code behind files</a:t>
-            </a:r>
-          </a:p>
-          <a:p>
-            <a:endParaRPr lang="en-US" sz="2400" dirty="0" smtClean="0"/>
-          </a:p>
-          <a:p>
-            <a:r>
-              <a:rPr lang="en-US" sz="2400" dirty="0" smtClean="0"/>
-              <a:t>MVC gives guidance about what kind of code goes where</a:t>
-            </a:r>
-          </a:p>
-          <a:p>
-            <a:endParaRPr lang="en-US" sz="2400" dirty="0" smtClean="0"/>
-          </a:p>
-          <a:p>
-            <a:r>
-              <a:rPr lang="en-US" sz="2400" dirty="0" smtClean="0"/>
-              <a:t>Convention over configuration</a:t>
-            </a:r>
+            <a:pPr algn="ctr"/>
+            <a:r>
+              <a:rPr lang="en-US" sz="4000" dirty="0" smtClean="0"/>
+              <a:t>Demo – Views, Models, and Scaffolding</a:t>
+            </a:r>
+            <a:endParaRPr lang="en-US" sz="4000" dirty="0">
+              <a:latin typeface="Trebuchet MS" pitchFamily="34" charset="0"/>
+            </a:endParaRPr>
           </a:p>
         </p:txBody>
       </p:sp>
     </p:spTree>
+    <p:extLst>
+      <p:ext uri="{BB962C8B-B14F-4D97-AF65-F5344CB8AC3E}">
+        <p14:creationId xmlns:p14="http://schemas.microsoft.com/office/powerpoint/2010/main" val="905088959"/>
+      </p:ext>
+    </p:extLst>
   </p:cSld>
   <p:clrMapOvr>
     <a:masterClrMapping/>
@@ -8109,45 +8941,178 @@
           <a:lstStyle/>
           <a:p>
             <a:r>
-              <a:rPr lang="en-US" smtClean="0"/>
-              <a:t>What problem is MVC trying to solve?</a:t>
-            </a:r>
-            <a:endParaRPr lang="en-US" dirty="0"/>
-          </a:p>
-        </p:txBody>
-      </p:sp>
+              <a:rPr lang="en-US" sz="3600" dirty="0"/>
+              <a:t>MVC: The good parts</a:t>
+            </a:r>
+          </a:p>
+        </p:txBody>
+      </p:sp>
+      <p:sp>
+        <p:nvSpPr>
+          <p:cNvPr id="3" name="Subtitle 2"/>
+          <p:cNvSpPr>
+            <a:spLocks noGrp="1"/>
+          </p:cNvSpPr>
+          <p:nvPr>
+            <p:ph idx="1"/>
+          </p:nvPr>
+        </p:nvSpPr>
+        <p:spPr/>
+        <p:txBody>
+          <a:bodyPr>
+            <a:normAutofit/>
+          </a:bodyPr>
+          <a:lstStyle/>
+          <a:p>
+            <a:pPr marL="0" indent="0">
+              <a:buNone/>
+            </a:pPr>
+            <a:r>
+              <a:rPr lang="en-US" sz="2400" dirty="0" smtClean="0">
+                <a:solidFill>
+                  <a:srgbClr val="0070C0"/>
+                </a:solidFill>
+              </a:rPr>
+              <a:t>Separation </a:t>
+            </a:r>
+            <a:r>
+              <a:rPr lang="en-US" sz="2400" dirty="0" smtClean="0">
+                <a:solidFill>
+                  <a:srgbClr val="0070C0"/>
+                </a:solidFill>
+              </a:rPr>
+              <a:t>of Concerns guidance</a:t>
+            </a:r>
+          </a:p>
+          <a:p>
+            <a:endParaRPr lang="en-US" sz="2400" dirty="0" smtClean="0"/>
+          </a:p>
+          <a:p>
+            <a:r>
+              <a:rPr lang="en-US" sz="2400" dirty="0" smtClean="0"/>
+              <a:t>Don’t </a:t>
+            </a:r>
+            <a:r>
+              <a:rPr lang="en-US" sz="2400" dirty="0" smtClean="0"/>
+              <a:t>dump </a:t>
+            </a:r>
+            <a:r>
+              <a:rPr lang="en-US" sz="2400" dirty="0" smtClean="0"/>
+              <a:t>all your code in </a:t>
+            </a:r>
+            <a:r>
+              <a:rPr lang="en-US" sz="2400" dirty="0" smtClean="0"/>
+              <a:t>HTML or code </a:t>
+            </a:r>
+            <a:r>
+              <a:rPr lang="en-US" sz="2400" dirty="0" smtClean="0"/>
+              <a:t>behind files</a:t>
+            </a:r>
+          </a:p>
+          <a:p>
+            <a:endParaRPr lang="en-US" sz="2400" dirty="0" smtClean="0"/>
+          </a:p>
+          <a:p>
+            <a:r>
+              <a:rPr lang="en-US" sz="2400" dirty="0" smtClean="0"/>
+              <a:t>MVC gives guidance about what kind of code goes where</a:t>
+            </a:r>
+          </a:p>
+          <a:p>
+            <a:endParaRPr lang="en-US" sz="2400" dirty="0" smtClean="0"/>
+          </a:p>
+          <a:p>
+            <a:r>
+              <a:rPr lang="en-US" sz="2400" dirty="0" smtClean="0"/>
+              <a:t>Convention over configuration</a:t>
+            </a:r>
+          </a:p>
+        </p:txBody>
+      </p:sp>
+    </p:spTree>
+  </p:cSld>
+  <p:clrMapOvr>
+    <a:masterClrMapping/>
+  </p:clrMapOvr>
+  <p:transition>
+    <p:fade/>
+  </p:transition>
+  <p:timing>
+    <p:tnLst>
+      <p:par>
+        <p:cTn id="1" dur="indefinite" restart="never" nodeType="tmRoot"/>
+      </p:par>
+    </p:tnLst>
+  </p:timing>
+</p:sld>
+</file>
+
+<file path=ppt/slides/slide22.xml><?xml version="1.0" encoding="utf-8"?>
+<p:sld xmlns:a="http://schemas.openxmlformats.org/drawingml/2006/main" xmlns:r="http://schemas.openxmlformats.org/officeDocument/2006/relationships" xmlns:p="http://schemas.openxmlformats.org/presentationml/2006/main">
+  <p:cSld>
+    <p:spTree>
+      <p:nvGrpSpPr>
+        <p:cNvPr id="1" name=""/>
+        <p:cNvGrpSpPr/>
+        <p:nvPr/>
+      </p:nvGrpSpPr>
+      <p:grpSpPr>
+        <a:xfrm>
+          <a:off x="0" y="0"/>
+          <a:ext cx="0" cy="0"/>
+          <a:chOff x="0" y="0"/>
+          <a:chExt cx="0" cy="0"/>
+        </a:xfrm>
+      </p:grpSpPr>
       <p:pic>
         <p:nvPicPr>
-          <p:cNvPr id="1027" name="Picture 3"/>
+          <p:cNvPr id="3" name="Picture 2"/>
           <p:cNvPicPr>
-            <a:picLocks noChangeAspect="1" noChangeArrowheads="1"/>
+            <a:picLocks noChangeAspect="1"/>
           </p:cNvPicPr>
           <p:nvPr/>
         </p:nvPicPr>
         <p:blipFill>
-          <a:blip r:embed="rId2" cstate="print"/>
-          <a:srcRect/>
+          <a:blip r:embed="rId2"/>
           <a:stretch>
             <a:fillRect/>
           </a:stretch>
         </p:blipFill>
-        <p:spPr bwMode="auto">
+        <p:spPr>
           <a:xfrm>
-            <a:off x="6019800" y="1371599"/>
-            <a:ext cx="2434266" cy="4953001"/>
+            <a:off x="6758137" y="0"/>
+            <a:ext cx="2390476" cy="6952381"/>
           </a:xfrm>
           <a:prstGeom prst="rect">
             <a:avLst/>
           </a:prstGeom>
-          <a:noFill/>
-          <a:ln w="9525">
-            <a:noFill/>
-            <a:miter lim="800000"/>
-            <a:headEnd/>
-            <a:tailEnd/>
-          </a:ln>
         </p:spPr>
       </p:pic>
+      <p:sp>
+        <p:nvSpPr>
+          <p:cNvPr id="2" name="Title 1"/>
+          <p:cNvSpPr>
+            <a:spLocks noGrp="1"/>
+          </p:cNvSpPr>
+          <p:nvPr>
+            <p:ph type="title"/>
+          </p:nvPr>
+        </p:nvSpPr>
+        <p:spPr/>
+        <p:txBody>
+          <a:bodyPr>
+            <a:normAutofit/>
+          </a:bodyPr>
+          <a:lstStyle/>
+          <a:p>
+            <a:r>
+              <a:rPr lang="en-US" sz="3600" dirty="0"/>
+              <a:t>MVC: The good parts</a:t>
+            </a:r>
+            <a:endParaRPr lang="en-US" sz="3600" dirty="0"/>
+          </a:p>
+        </p:txBody>
+      </p:sp>
       <p:cxnSp>
         <p:nvCxnSpPr>
           <p:cNvPr id="9" name="Straight Arrow Connector 8"/>
@@ -8155,9 +9120,9 @@
           <p:nvPr/>
         </p:nvCxnSpPr>
         <p:spPr>
-          <a:xfrm>
-            <a:off x="4267200" y="1981199"/>
-            <a:ext cx="2133600" cy="609600"/>
+          <a:xfrm flipV="1">
+            <a:off x="5562600" y="1295401"/>
+            <a:ext cx="1447800" cy="395288"/>
           </a:xfrm>
           <a:prstGeom prst="straightConnector1">
             <a:avLst/>
@@ -8170,13 +9135,7 @@
             </a:solidFill>
             <a:tailEnd type="arrow"/>
           </a:ln>
-          <a:effectLst>
-            <a:outerShdw blurRad="50800" dist="38100" dir="2700000" algn="tl" rotWithShape="0">
-              <a:prstClr val="black">
-                <a:alpha val="40000"/>
-              </a:prstClr>
-            </a:outerShdw>
-          </a:effectLst>
+          <a:effectLst/>
         </p:spPr>
         <p:style>
           <a:lnRef idx="1">
@@ -8200,9 +9159,9 @@
           <p:nvPr/>
         </p:nvCxnSpPr>
         <p:spPr>
-          <a:xfrm>
-            <a:off x="2286000" y="2438399"/>
-            <a:ext cx="4114800" cy="533400"/>
+          <a:xfrm flipV="1">
+            <a:off x="2286000" y="1690689"/>
+            <a:ext cx="4724400" cy="747710"/>
           </a:xfrm>
           <a:prstGeom prst="straightConnector1">
             <a:avLst/>
@@ -8215,13 +9174,7 @@
             </a:solidFill>
             <a:tailEnd type="arrow"/>
           </a:ln>
-          <a:effectLst>
-            <a:outerShdw blurRad="50800" dist="38100" dir="2700000" algn="tl" rotWithShape="0">
-              <a:prstClr val="black">
-                <a:alpha val="40000"/>
-              </a:prstClr>
-            </a:outerShdw>
-          </a:effectLst>
+          <a:effectLst/>
         </p:spPr>
         <p:style>
           <a:lnRef idx="1">
@@ -8246,8 +9199,8 @@
         </p:nvCxnSpPr>
         <p:spPr>
           <a:xfrm flipV="1">
-            <a:off x="2286000" y="3201987"/>
-            <a:ext cx="4038600" cy="74612"/>
+            <a:off x="2286000" y="2681289"/>
+            <a:ext cx="4800600" cy="595310"/>
           </a:xfrm>
           <a:prstGeom prst="straightConnector1">
             <a:avLst/>
@@ -8260,13 +9213,7 @@
             </a:solidFill>
             <a:tailEnd type="arrow"/>
           </a:ln>
-          <a:effectLst>
-            <a:outerShdw blurRad="50800" dist="38100" dir="2700000" algn="tl" rotWithShape="0">
-              <a:prstClr val="black">
-                <a:alpha val="40000"/>
-              </a:prstClr>
-            </a:outerShdw>
-          </a:effectLst>
+          <a:effectLst/>
         </p:spPr>
         <p:style>
           <a:lnRef idx="1">
@@ -8291,8 +9238,8 @@
         </p:nvCxnSpPr>
         <p:spPr>
           <a:xfrm flipV="1">
-            <a:off x="4267200" y="3352799"/>
-            <a:ext cx="2057400" cy="304800"/>
+            <a:off x="4267200" y="2857499"/>
+            <a:ext cx="2819400" cy="800100"/>
           </a:xfrm>
           <a:prstGeom prst="straightConnector1">
             <a:avLst/>
@@ -8305,13 +9252,7 @@
             </a:solidFill>
             <a:tailEnd type="arrow"/>
           </a:ln>
-          <a:effectLst>
-            <a:outerShdw blurRad="50800" dist="38100" dir="2700000" algn="tl" rotWithShape="0">
-              <a:prstClr val="black">
-                <a:alpha val="40000"/>
-              </a:prstClr>
-            </a:outerShdw>
-          </a:effectLst>
+          <a:effectLst/>
         </p:spPr>
         <p:style>
           <a:lnRef idx="1">
@@ -8338,8 +9279,8 @@
         </p:nvCxnSpPr>
         <p:spPr>
           <a:xfrm flipV="1">
-            <a:off x="2362200" y="3657599"/>
-            <a:ext cx="4038600" cy="992833"/>
+            <a:off x="2362200" y="3123082"/>
+            <a:ext cx="4724400" cy="1527350"/>
           </a:xfrm>
           <a:prstGeom prst="straightConnector1">
             <a:avLst/>
@@ -8352,13 +9293,7 @@
             </a:solidFill>
             <a:tailEnd type="arrow"/>
           </a:ln>
-          <a:effectLst>
-            <a:outerShdw blurRad="50800" dist="38100" dir="2700000" algn="tl" rotWithShape="0">
-              <a:prstClr val="black">
-                <a:alpha val="40000"/>
-              </a:prstClr>
-            </a:outerShdw>
-          </a:effectLst>
+          <a:effectLst/>
         </p:spPr>
         <p:style>
           <a:lnRef idx="1">
@@ -8384,7 +9319,7 @@
         <p:spPr>
           <a:xfrm>
             <a:off x="2362200" y="5867399"/>
-            <a:ext cx="4114800" cy="1588"/>
+            <a:ext cx="4572000" cy="381000"/>
           </a:xfrm>
           <a:prstGeom prst="straightConnector1">
             <a:avLst/>
@@ -8397,13 +9332,7 @@
             </a:solidFill>
             <a:tailEnd type="arrow"/>
           </a:ln>
-          <a:effectLst>
-            <a:outerShdw blurRad="50800" dist="38100" dir="2700000" algn="tl" rotWithShape="0">
-              <a:prstClr val="black">
-                <a:alpha val="40000"/>
-              </a:prstClr>
-            </a:outerShdw>
-          </a:effectLst>
+          <a:effectLst/>
         </p:spPr>
         <p:style>
           <a:lnRef idx="1">
@@ -8428,8 +9357,8 @@
         </p:nvCxnSpPr>
         <p:spPr>
           <a:xfrm flipV="1">
-            <a:off x="4572000" y="4419599"/>
-            <a:ext cx="1981200" cy="685800"/>
+            <a:off x="4572000" y="4084673"/>
+            <a:ext cx="2895600" cy="1020726"/>
           </a:xfrm>
           <a:prstGeom prst="straightConnector1">
             <a:avLst/>
@@ -8442,13 +9371,7 @@
             </a:solidFill>
             <a:tailEnd type="arrow"/>
           </a:ln>
-          <a:effectLst>
-            <a:outerShdw blurRad="50800" dist="38100" dir="2700000" algn="tl" rotWithShape="0">
-              <a:prstClr val="black">
-                <a:alpha val="40000"/>
-              </a:prstClr>
-            </a:outerShdw>
-          </a:effectLst>
+          <a:effectLst/>
         </p:spPr>
         <p:style>
           <a:lnRef idx="1">
@@ -8473,7 +9396,7 @@
         </p:nvSpPr>
         <p:spPr>
           <a:xfrm>
-            <a:off x="2514600" y="1523999"/>
+            <a:off x="2549611" y="1403001"/>
             <a:ext cx="3048000" cy="461665"/>
           </a:xfrm>
           <a:prstGeom prst="rect">
@@ -8504,7 +9427,7 @@
         </p:nvSpPr>
         <p:spPr>
           <a:xfrm>
-            <a:off x="457200" y="2133599"/>
+            <a:off x="495300" y="2167234"/>
             <a:ext cx="1828800" cy="461665"/>
           </a:xfrm>
           <a:prstGeom prst="rect">
@@ -8566,7 +9489,7 @@
         </p:nvSpPr>
         <p:spPr>
           <a:xfrm>
-            <a:off x="2514600" y="3428999"/>
+            <a:off x="2457461" y="3397757"/>
             <a:ext cx="1828800" cy="461665"/>
           </a:xfrm>
           <a:prstGeom prst="rect">
@@ -8628,7 +9551,7 @@
         </p:nvSpPr>
         <p:spPr>
           <a:xfrm>
-            <a:off x="2667000" y="4876799"/>
+            <a:off x="2605216" y="4868560"/>
             <a:ext cx="1981200" cy="461665"/>
           </a:xfrm>
           <a:prstGeom prst="rect">
@@ -8645,7 +9568,7 @@
             <a:pPr algn="r"/>
             <a:r>
               <a:rPr lang="en-US" sz="2400" dirty="0" smtClean="0"/>
-              <a:t>Master Pages</a:t>
+              <a:t>Layout</a:t>
             </a:r>
             <a:endParaRPr lang="en-US" sz="2400" dirty="0"/>
           </a:p>
@@ -8659,7 +9582,7 @@
         </p:nvSpPr>
         <p:spPr>
           <a:xfrm>
-            <a:off x="457200" y="5638799"/>
+            <a:off x="495300" y="5596579"/>
             <a:ext cx="1905000" cy="461665"/>
           </a:xfrm>
           <a:prstGeom prst="rect">
@@ -9917,138 +10840,6 @@
 </p:sld>
 </file>
 
-<file path=ppt/slides/slide22.xml><?xml version="1.0" encoding="utf-8"?>
-<p:sld xmlns:a="http://schemas.openxmlformats.org/drawingml/2006/main" xmlns:r="http://schemas.openxmlformats.org/officeDocument/2006/relationships" xmlns:p="http://schemas.openxmlformats.org/presentationml/2006/main">
-  <p:cSld>
-    <p:spTree>
-      <p:nvGrpSpPr>
-        <p:cNvPr id="1" name=""/>
-        <p:cNvGrpSpPr/>
-        <p:nvPr/>
-      </p:nvGrpSpPr>
-      <p:grpSpPr>
-        <a:xfrm>
-          <a:off x="0" y="0"/>
-          <a:ext cx="0" cy="0"/>
-          <a:chOff x="0" y="0"/>
-          <a:chExt cx="0" cy="0"/>
-        </a:xfrm>
-      </p:grpSpPr>
-      <p:sp>
-        <p:nvSpPr>
-          <p:cNvPr id="2" name="Title 1"/>
-          <p:cNvSpPr>
-            <a:spLocks noGrp="1"/>
-          </p:cNvSpPr>
-          <p:nvPr>
-            <p:ph type="title"/>
-          </p:nvPr>
-        </p:nvSpPr>
-        <p:spPr/>
-        <p:txBody>
-          <a:bodyPr/>
-          <a:lstStyle/>
-          <a:p>
-            <a:r>
-              <a:rPr lang="en-US" dirty="0" smtClean="0"/>
-              <a:t>What problem is MVC trying to solve?</a:t>
-            </a:r>
-            <a:endParaRPr lang="en-US" dirty="0"/>
-          </a:p>
-        </p:txBody>
-      </p:sp>
-      <p:sp>
-        <p:nvSpPr>
-          <p:cNvPr id="3" name="Subtitle 2"/>
-          <p:cNvSpPr>
-            <a:spLocks noGrp="1"/>
-          </p:cNvSpPr>
-          <p:nvPr>
-            <p:ph idx="1"/>
-          </p:nvPr>
-        </p:nvSpPr>
-        <p:spPr/>
-        <p:txBody>
-          <a:bodyPr>
-            <a:normAutofit/>
-          </a:bodyPr>
-          <a:lstStyle/>
-          <a:p>
-            <a:pPr marL="0" indent="0">
-              <a:buNone/>
-            </a:pPr>
-            <a:r>
-              <a:rPr lang="en-US" sz="2400" dirty="0" smtClean="0"/>
-              <a:t>Problem: </a:t>
-            </a:r>
-            <a:r>
-              <a:rPr lang="en-US" sz="2400" dirty="0" smtClean="0">
-                <a:solidFill>
-                  <a:srgbClr val="0070C0"/>
-                </a:solidFill>
-              </a:rPr>
-              <a:t>Web code testability</a:t>
-            </a:r>
-          </a:p>
-          <a:p>
-            <a:endParaRPr lang="en-US" sz="2400" dirty="0" smtClean="0"/>
-          </a:p>
-          <a:p>
-            <a:r>
-              <a:rPr lang="en-US" sz="2400" dirty="0" smtClean="0"/>
-              <a:t>Code behind files are hard to test</a:t>
-            </a:r>
-          </a:p>
-          <a:p>
-            <a:endParaRPr lang="en-US" sz="2400" dirty="0" smtClean="0"/>
-          </a:p>
-          <a:p>
-            <a:r>
-              <a:rPr lang="en-US" sz="2400" dirty="0" err="1" smtClean="0"/>
-              <a:t>HttpContext</a:t>
-            </a:r>
-            <a:r>
-              <a:rPr lang="en-US" sz="2400" dirty="0" smtClean="0"/>
-              <a:t> is hard to mock</a:t>
-            </a:r>
-          </a:p>
-          <a:p>
-            <a:endParaRPr lang="en-US" sz="2400" dirty="0" smtClean="0"/>
-          </a:p>
-          <a:p>
-            <a:r>
-              <a:rPr lang="en-US" sz="2400" dirty="0" smtClean="0"/>
-              <a:t>MVC provides </a:t>
-            </a:r>
-            <a:r>
-              <a:rPr lang="en-US" sz="2400" dirty="0" err="1" smtClean="0"/>
-              <a:t>mockable</a:t>
-            </a:r>
-            <a:r>
-              <a:rPr lang="en-US" sz="2400" dirty="0" smtClean="0"/>
-              <a:t> abstract classes (but mocking is still not as easy as it could be)</a:t>
-            </a:r>
-          </a:p>
-        </p:txBody>
-      </p:sp>
-    </p:spTree>
-  </p:cSld>
-  <p:clrMapOvr>
-    <a:masterClrMapping/>
-  </p:clrMapOvr>
-  <p:transition>
-    <p:fade/>
-  </p:transition>
-  <p:timing>
-    <p:tnLst>
-      <p:par>
-        <p:cTn id="1" dur="indefinite" restart="never" nodeType="tmRoot"/>
-      </p:par>
-    </p:tnLst>
-  </p:timing>
-</p:sld>
-</file>
-
 <file path=ppt/slides/slide23.xml><?xml version="1.0" encoding="utf-8"?>
 <p:sld xmlns:a="http://schemas.openxmlformats.org/drawingml/2006/main" xmlns:r="http://schemas.openxmlformats.org/officeDocument/2006/relationships" xmlns:p="http://schemas.openxmlformats.org/presentationml/2006/main">
   <p:cSld>
@@ -10082,8 +10873,8 @@
           <a:lstStyle/>
           <a:p>
             <a:r>
-              <a:rPr lang="en-US" dirty="0" smtClean="0"/>
-              <a:t>What are the benefits of MVC?</a:t>
+              <a:rPr lang="en-US" sz="3200" dirty="0"/>
+              <a:t>MVC: The good parts</a:t>
             </a:r>
             <a:endParaRPr lang="en-US" dirty="0"/>
           </a:p>
@@ -10110,19 +10901,13 @@
               <a:buNone/>
             </a:pPr>
             <a:r>
-              <a:rPr lang="en-US" sz="2400" dirty="0" smtClean="0"/>
-              <a:t>Benefit: </a:t>
-            </a:r>
-            <a:r>
               <a:rPr lang="en-US" sz="2400" dirty="0" smtClean="0">
                 <a:solidFill>
                   <a:srgbClr val="0070C0"/>
                 </a:solidFill>
               </a:rPr>
-              <a:t>Clean HTML</a:t>
-            </a:r>
-          </a:p>
-          <a:p>
+              <a:t>Testability</a:t>
+            </a:r>
             <a:endParaRPr lang="en-US" sz="2400" dirty="0" smtClean="0">
               <a:solidFill>
                 <a:srgbClr val="0070C0"/>
@@ -10130,18 +10915,26 @@
             </a:endParaRPr>
           </a:p>
           <a:p>
+            <a:endParaRPr lang="en-US" sz="2400" dirty="0" smtClean="0"/>
+          </a:p>
+          <a:p>
             <a:r>
               <a:rPr lang="en-US" sz="2400" dirty="0" smtClean="0"/>
-              <a:t>MVC controls keep their IDs</a:t>
-            </a:r>
-          </a:p>
-          <a:p>
+              <a:t>Putting as much logic as possible in POCOs leads to easier testing</a:t>
+            </a:r>
             <a:endParaRPr lang="en-US" sz="2400" dirty="0" smtClean="0"/>
           </a:p>
           <a:p>
+            <a:endParaRPr lang="en-US" sz="2400" dirty="0" smtClean="0"/>
+          </a:p>
+          <a:p>
+            <a:r>
+              <a:rPr lang="en-US" sz="2400" dirty="0" err="1" smtClean="0"/>
+              <a:t>HttpContext</a:t>
+            </a:r>
             <a:r>
               <a:rPr lang="en-US" sz="2400" dirty="0" smtClean="0"/>
-              <a:t>Easier to navigate with JavaScript and jQuery</a:t>
+              <a:t> is hard to mock</a:t>
             </a:r>
           </a:p>
           <a:p>
@@ -10150,22 +10943,25 @@
           <a:p>
             <a:r>
               <a:rPr lang="en-US" sz="2400" dirty="0" smtClean="0"/>
-              <a:t>Easier to build Section 508 compliant </a:t>
+              <a:t>MVC provides </a:t>
+            </a:r>
+            <a:r>
+              <a:rPr lang="en-US" sz="2400" dirty="0" err="1" smtClean="0"/>
+              <a:t>mockable</a:t>
             </a:r>
             <a:r>
               <a:rPr lang="en-US" sz="2400" dirty="0" smtClean="0"/>
-              <a:t>sites</a:t>
+              <a:t> abstract </a:t>
+            </a:r>
+            <a:r>
+              <a:rPr lang="en-US" sz="2400" dirty="0" smtClean="0"/>
+              <a:t>classes</a:t>
             </a:r>
             <a:endParaRPr lang="en-US" sz="2400" dirty="0" smtClean="0"/>
           </a:p>
         </p:txBody>
       </p:sp>
     </p:spTree>
-    <p:extLst>
-      <p:ext uri="{BB962C8B-B14F-4D97-AF65-F5344CB8AC3E}">
-        <p14:creationId xmlns:p14="http://schemas.microsoft.com/office/powerpoint/2010/main" val="2589465814"/>
-      </p:ext>
-    </p:extLst>
   </p:cSld>
   <p:clrMapOvr>
     <a:masterClrMapping/>
@@ -10210,6 +11006,144 @@
             <p:ph type="title"/>
           </p:nvPr>
         </p:nvSpPr>
+        <p:spPr/>
+        <p:txBody>
+          <a:bodyPr/>
+          <a:lstStyle/>
+          <a:p>
+            <a:r>
+              <a:rPr lang="en-US" sz="3600" dirty="0"/>
+              <a:t>MVC: The good parts</a:t>
+            </a:r>
+            <a:endParaRPr lang="en-US" dirty="0"/>
+          </a:p>
+        </p:txBody>
+      </p:sp>
+      <p:sp>
+        <p:nvSpPr>
+          <p:cNvPr id="3" name="Subtitle 2"/>
+          <p:cNvSpPr>
+            <a:spLocks noGrp="1"/>
+          </p:cNvSpPr>
+          <p:nvPr>
+            <p:ph idx="1"/>
+          </p:nvPr>
+        </p:nvSpPr>
+        <p:spPr/>
+        <p:txBody>
+          <a:bodyPr>
+            <a:normAutofit/>
+          </a:bodyPr>
+          <a:lstStyle/>
+          <a:p>
+            <a:pPr marL="0" indent="0">
+              <a:buNone/>
+            </a:pPr>
+            <a:r>
+              <a:rPr lang="en-US" sz="2400" dirty="0" smtClean="0">
+                <a:solidFill>
+                  <a:srgbClr val="0070C0"/>
+                </a:solidFill>
+              </a:rPr>
+              <a:t>Clean </a:t>
+            </a:r>
+            <a:r>
+              <a:rPr lang="en-US" sz="2400" dirty="0" smtClean="0">
+                <a:solidFill>
+                  <a:srgbClr val="0070C0"/>
+                </a:solidFill>
+              </a:rPr>
+              <a:t>HTML</a:t>
+            </a:r>
+          </a:p>
+          <a:p>
+            <a:endParaRPr lang="en-US" sz="2400" dirty="0" smtClean="0">
+              <a:solidFill>
+                <a:srgbClr val="0070C0"/>
+              </a:solidFill>
+            </a:endParaRPr>
+          </a:p>
+          <a:p>
+            <a:r>
+              <a:rPr lang="en-US" sz="2400" dirty="0" smtClean="0"/>
+              <a:t>MVC controls keep their IDs</a:t>
+            </a:r>
+          </a:p>
+          <a:p>
+            <a:endParaRPr lang="en-US" sz="2400" dirty="0" smtClean="0"/>
+          </a:p>
+          <a:p>
+            <a:r>
+              <a:rPr lang="en-US" sz="2400" dirty="0" smtClean="0"/>
+              <a:t>Easier to navigate with JavaScript and jQuery</a:t>
+            </a:r>
+          </a:p>
+          <a:p>
+            <a:endParaRPr lang="en-US" sz="2400" dirty="0" smtClean="0"/>
+          </a:p>
+          <a:p>
+            <a:r>
+              <a:rPr lang="en-US" sz="2400" dirty="0" smtClean="0"/>
+              <a:t>Easier to build Section 508 compliant </a:t>
+            </a:r>
+            <a:r>
+              <a:rPr lang="en-US" sz="2400" dirty="0" smtClean="0"/>
+              <a:t>sites</a:t>
+            </a:r>
+            <a:endParaRPr lang="en-US" sz="2400" dirty="0" smtClean="0"/>
+          </a:p>
+        </p:txBody>
+      </p:sp>
+    </p:spTree>
+    <p:extLst>
+      <p:ext uri="{BB962C8B-B14F-4D97-AF65-F5344CB8AC3E}">
+        <p14:creationId xmlns:p14="http://schemas.microsoft.com/office/powerpoint/2010/main" val="2589465814"/>
+      </p:ext>
+    </p:extLst>
+  </p:cSld>
+  <p:clrMapOvr>
+    <a:masterClrMapping/>
+  </p:clrMapOvr>
+  <p:transition>
+    <p:fade/>
+  </p:transition>
+  <p:timing>
+    <p:tnLst>
+      <p:par>
+        <p:cTn id="1" dur="indefinite" restart="never" nodeType="tmRoot"/>
+      </p:par>
+    </p:tnLst>
+  </p:timing>
+</p:sld>
+</file>
+
+<file path=ppt/slides/slide25.xml><?xml version="1.0" encoding="utf-8"?>
+<p:sld xmlns:a="http://schemas.openxmlformats.org/drawingml/2006/main" xmlns:r="http://schemas.openxmlformats.org/officeDocument/2006/relationships" xmlns:p="http://schemas.openxmlformats.org/presentationml/2006/main">
+  <p:cSld>
+    <p:spTree>
+      <p:nvGrpSpPr>
+        <p:cNvPr id="1" name=""/>
+        <p:cNvGrpSpPr/>
+        <p:nvPr/>
+      </p:nvGrpSpPr>
+      <p:grpSpPr>
+        <a:xfrm>
+          <a:off x="0" y="0"/>
+          <a:ext cx="0" cy="0"/>
+          <a:chOff x="0" y="0"/>
+          <a:chExt cx="0" cy="0"/>
+        </a:xfrm>
+      </p:grpSpPr>
+      <p:sp>
+        <p:nvSpPr>
+          <p:cNvPr id="2" name="Title 1"/>
+          <p:cNvSpPr>
+            <a:spLocks noGrp="1"/>
+          </p:cNvSpPr>
+          <p:nvPr>
+            <p:ph type="title"/>
+          </p:nvPr>
+        </p:nvSpPr>
         <p:spPr>
           <a:ln>
             <a:noFill/>
@@ -10222,8 +11156,8 @@
           <a:lstStyle/>
           <a:p>
             <a:r>
-              <a:rPr lang="en-US" sz="3600" dirty="0" smtClean="0"/>
-              <a:t>What are the benefits of MVC?</a:t>
+              <a:rPr lang="en-US" sz="3600" dirty="0"/>
+              <a:t>MVC: The good parts</a:t>
             </a:r>
             <a:endParaRPr lang="en-US" sz="3600" dirty="0"/>
           </a:p>
@@ -10930,7 +11864,7 @@
         </p:nvCxnSpPr>
         <p:spPr>
           <a:xfrm>
-            <a:off x="1371600" y="4191000"/>
+            <a:off x="1363362" y="4055076"/>
             <a:ext cx="6400800" cy="0"/>
           </a:xfrm>
           <a:prstGeom prst="line">
@@ -10967,7 +11901,7 @@
         </p:nvCxnSpPr>
         <p:spPr>
           <a:xfrm>
-            <a:off x="5181600" y="6019800"/>
+            <a:off x="5181600" y="5953896"/>
             <a:ext cx="838200" cy="0"/>
           </a:xfrm>
           <a:prstGeom prst="line">
@@ -11609,7 +12543,7 @@
 </p:sld>
 </file>
 
-<file path=ppt/slides/slide25.xml><?xml version="1.0" encoding="utf-8"?>
+<file path=ppt/slides/slide26.xml><?xml version="1.0" encoding="utf-8"?>
 <p:sld xmlns:a="http://schemas.openxmlformats.org/drawingml/2006/main" xmlns:r="http://schemas.openxmlformats.org/officeDocument/2006/relationships" xmlns:p="http://schemas.openxmlformats.org/presentationml/2006/main">
   <p:cSld>
     <p:spTree>
@@ -11642,12 +12576,8 @@
           <a:lstStyle/>
           <a:p>
             <a:r>
-              <a:rPr lang="en-US" dirty="0" smtClean="0"/>
-              <a:t>What are the benefits of </a:t>
-            </a:r>
-            <a:r>
-              <a:rPr lang="en-US" dirty="0" smtClean="0"/>
-              <a:t>MVC and Web API?</a:t>
+              <a:rPr lang="en-US" sz="3600" dirty="0"/>
+              <a:t>MVC: The good parts</a:t>
             </a:r>
             <a:endParaRPr lang="en-US" dirty="0"/>
           </a:p>
@@ -11674,16 +12604,20 @@
               <a:buNone/>
             </a:pPr>
             <a:r>
-              <a:rPr lang="en-US" sz="2400" dirty="0" smtClean="0"/>
-              <a:t>Benefit: </a:t>
-            </a:r>
-            <a:r>
               <a:rPr lang="en-US" sz="2400" dirty="0" smtClean="0">
                 <a:solidFill>
                   <a:srgbClr val="0070C0"/>
                 </a:solidFill>
               </a:rPr>
-              <a:t>Clean URLs</a:t>
+              <a:t>Clean </a:t>
+            </a:r>
+            <a:r>
+              <a:rPr lang="en-US" sz="2400" dirty="0" smtClean="0">
+                <a:solidFill>
+                  <a:srgbClr val="0070C0"/>
+                </a:solidFill>
+              </a:rPr>
+              <a:t>URLs</a:t>
             </a:r>
           </a:p>
           <a:p>
@@ -11753,7 +12687,7 @@
 </p:sld>
 </file>
 
-<file path=ppt/slides/slide26.xml><?xml version="1.0" encoding="utf-8"?>
+<file path=ppt/slides/slide27.xml><?xml version="1.0" encoding="utf-8"?>
 <p:sld xmlns:a="http://schemas.openxmlformats.org/drawingml/2006/main" xmlns:r="http://schemas.openxmlformats.org/officeDocument/2006/relationships" xmlns:p="http://schemas.openxmlformats.org/presentationml/2006/main">
   <p:cSld>
     <p:spTree>
@@ -11793,8 +12727,9 @@
           <a:p>
             <a:r>
               <a:rPr lang="en-US" sz="3600" dirty="0"/>
-              <a:t>What are the benefits of MVC?</a:t>
-            </a:r>
+              <a:t>MVC: The good parts</a:t>
+            </a:r>
+            <a:endParaRPr lang="en-US" sz="3600" dirty="0"/>
           </a:p>
         </p:txBody>
       </p:sp>
@@ -12063,7 +12998,7 @@
         </p:nvCxnSpPr>
         <p:spPr>
           <a:xfrm>
-            <a:off x="3200400" y="2971800"/>
+            <a:off x="3200400" y="2895600"/>
             <a:ext cx="3505200" cy="0"/>
           </a:xfrm>
           <a:prstGeom prst="line">
@@ -12100,7 +13035,7 @@
         </p:nvCxnSpPr>
         <p:spPr>
           <a:xfrm>
-            <a:off x="3200400" y="3505200"/>
+            <a:off x="3200400" y="3429000"/>
             <a:ext cx="2286000" cy="0"/>
           </a:xfrm>
           <a:prstGeom prst="line">
@@ -12137,7 +13072,7 @@
         </p:nvCxnSpPr>
         <p:spPr>
           <a:xfrm>
-            <a:off x="3276600" y="4991100"/>
+            <a:off x="3276600" y="4953000"/>
             <a:ext cx="2819400" cy="0"/>
           </a:xfrm>
           <a:prstGeom prst="line">
@@ -12174,7 +13109,7 @@
         </p:nvCxnSpPr>
         <p:spPr>
           <a:xfrm>
-            <a:off x="3276600" y="5486400"/>
+            <a:off x="3276600" y="5426676"/>
             <a:ext cx="1524000" cy="0"/>
           </a:xfrm>
           <a:prstGeom prst="line">
@@ -12801,160 +13736,6 @@
 </p:sld>
 </file>
 
-<file path=ppt/slides/slide27.xml><?xml version="1.0" encoding="utf-8"?>
-<p:sld xmlns:a="http://schemas.openxmlformats.org/drawingml/2006/main" xmlns:r="http://schemas.openxmlformats.org/officeDocument/2006/relationships" xmlns:p="http://schemas.openxmlformats.org/presentationml/2006/main">
-  <p:cSld>
-    <p:spTree>
-      <p:nvGrpSpPr>
-        <p:cNvPr id="1" name=""/>
-        <p:cNvGrpSpPr/>
-        <p:nvPr/>
-      </p:nvGrpSpPr>
-      <p:grpSpPr>
-        <a:xfrm>
-          <a:off x="0" y="0"/>
-          <a:ext cx="0" cy="0"/>
-          <a:chOff x="0" y="0"/>
-          <a:chExt cx="0" cy="0"/>
-        </a:xfrm>
-      </p:grpSpPr>
-      <p:sp>
-        <p:nvSpPr>
-          <p:cNvPr id="2" name="Title 1"/>
-          <p:cNvSpPr>
-            <a:spLocks noGrp="1"/>
-          </p:cNvSpPr>
-          <p:nvPr>
-            <p:ph type="title"/>
-          </p:nvPr>
-        </p:nvSpPr>
-        <p:spPr/>
-        <p:txBody>
-          <a:bodyPr/>
-          <a:lstStyle/>
-          <a:p>
-            <a:r>
-              <a:rPr lang="en-US" dirty="0" smtClean="0"/>
-              <a:t>What are the benefits of MVC and Web API?</a:t>
-            </a:r>
-            <a:endParaRPr lang="en-US" dirty="0"/>
-          </a:p>
-        </p:txBody>
-      </p:sp>
-      <p:sp>
-        <p:nvSpPr>
-          <p:cNvPr id="3" name="Subtitle 2"/>
-          <p:cNvSpPr>
-            <a:spLocks noGrp="1"/>
-          </p:cNvSpPr>
-          <p:nvPr>
-            <p:ph idx="1"/>
-          </p:nvPr>
-        </p:nvSpPr>
-        <p:spPr/>
-        <p:txBody>
-          <a:bodyPr>
-            <a:normAutofit/>
-          </a:bodyPr>
-          <a:lstStyle/>
-          <a:p>
-            <a:pPr marL="0" indent="0">
-              <a:buNone/>
-            </a:pPr>
-            <a:r>
-              <a:rPr lang="en-US" sz="2400" dirty="0" smtClean="0"/>
-              <a:t>Benefit: </a:t>
-            </a:r>
-            <a:r>
-              <a:rPr lang="en-US" sz="2400" dirty="0" smtClean="0">
-                <a:solidFill>
-                  <a:srgbClr val="0070C0"/>
-                </a:solidFill>
-              </a:rPr>
-              <a:t>Headroom</a:t>
-            </a:r>
-          </a:p>
-          <a:p>
-            <a:endParaRPr lang="en-US" sz="2400" dirty="0" smtClean="0"/>
-          </a:p>
-          <a:p>
-            <a:r>
-              <a:rPr lang="en-US" sz="2400" dirty="0" smtClean="0"/>
-              <a:t>Extensible</a:t>
-            </a:r>
-          </a:p>
-          <a:p>
-            <a:pPr lvl="1"/>
-            <a:r>
-              <a:rPr lang="en-US" sz="2000" dirty="0" smtClean="0"/>
-              <a:t>Custom Routing</a:t>
-            </a:r>
-          </a:p>
-          <a:p>
-            <a:pPr lvl="1"/>
-            <a:r>
-              <a:rPr lang="en-US" sz="2000" dirty="0" smtClean="0"/>
-              <a:t>Custom View Engine</a:t>
-            </a:r>
-          </a:p>
-          <a:p>
-            <a:pPr lvl="1"/>
-            <a:r>
-              <a:rPr lang="en-US" sz="2000" dirty="0" smtClean="0"/>
-              <a:t>Custom Model/Parameter Binders</a:t>
-            </a:r>
-          </a:p>
-          <a:p>
-            <a:pPr lvl="1"/>
-            <a:r>
-              <a:rPr lang="en-US" sz="2000" dirty="0" smtClean="0"/>
-              <a:t>Custom Action Filters</a:t>
-            </a:r>
-          </a:p>
-          <a:p>
-            <a:pPr lvl="1"/>
-            <a:r>
-              <a:rPr lang="en-US" sz="2000" dirty="0" smtClean="0"/>
-              <a:t>Custom Formatters</a:t>
-            </a:r>
-            <a:endParaRPr lang="en-US" sz="2000" dirty="0" smtClean="0"/>
-          </a:p>
-          <a:p>
-            <a:pPr lvl="1"/>
-            <a:endParaRPr lang="en-US" sz="2000" dirty="0" smtClean="0"/>
-          </a:p>
-          <a:p>
-            <a:r>
-              <a:rPr lang="en-US" sz="2400" dirty="0" smtClean="0"/>
-              <a:t>All code is released as open source</a:t>
-            </a:r>
-            <a:endParaRPr lang="en-US" sz="2400" dirty="0" smtClean="0"/>
-          </a:p>
-        </p:txBody>
-      </p:sp>
-    </p:spTree>
-    <p:extLst>
-      <p:ext uri="{BB962C8B-B14F-4D97-AF65-F5344CB8AC3E}">
-        <p14:creationId xmlns:p14="http://schemas.microsoft.com/office/powerpoint/2010/main" val="573997567"/>
-      </p:ext>
-    </p:extLst>
-  </p:cSld>
-  <p:clrMapOvr>
-    <a:masterClrMapping/>
-  </p:clrMapOvr>
-  <p:transition>
-    <p:fade/>
-  </p:transition>
-  <p:timing>
-    <p:tnLst>
-      <p:par>
-        <p:cTn id="1" dur="indefinite" restart="never" nodeType="tmRoot"/>
-      </p:par>
-    </p:tnLst>
-  </p:timing>
-</p:sld>
-</file>
-
 <file path=ppt/slides/slide28.xml><?xml version="1.0" encoding="utf-8"?>
 <p:sld xmlns:a="http://schemas.openxmlformats.org/drawingml/2006/main" xmlns:r="http://schemas.openxmlformats.org/officeDocument/2006/relationships" xmlns:p="http://schemas.openxmlformats.org/presentationml/2006/main">
   <p:cSld>
@@ -12982,39 +13763,112 @@
             <p:ph type="title"/>
           </p:nvPr>
         </p:nvSpPr>
-        <p:spPr>
-          <a:xfrm>
-            <a:off x="685800" y="2743200"/>
-            <a:ext cx="7886700" cy="1325563"/>
-          </a:xfrm>
-          <a:ln>
-            <a:noFill/>
-          </a:ln>
-        </p:spPr>
+        <p:spPr/>
+        <p:txBody>
+          <a:bodyPr/>
+          <a:lstStyle/>
+          <a:p>
+            <a:r>
+              <a:rPr lang="en-US" sz="3200" dirty="0"/>
+              <a:t>MVC: The good parts</a:t>
+            </a:r>
+            <a:endParaRPr lang="en-US" dirty="0"/>
+          </a:p>
+        </p:txBody>
+      </p:sp>
+      <p:sp>
+        <p:nvSpPr>
+          <p:cNvPr id="3" name="Subtitle 2"/>
+          <p:cNvSpPr>
+            <a:spLocks noGrp="1"/>
+          </p:cNvSpPr>
+          <p:nvPr>
+            <p:ph idx="1"/>
+          </p:nvPr>
+        </p:nvSpPr>
+        <p:spPr/>
         <p:txBody>
           <a:bodyPr>
             <a:normAutofit/>
           </a:bodyPr>
           <a:lstStyle/>
           <a:p>
-            <a:pPr algn="ctr"/>
-            <a:r>
-              <a:rPr lang="en-US" sz="4000" dirty="0" smtClean="0"/>
-              <a:t>Code</a:t>
-            </a:r>
-            <a:r>
-              <a:rPr lang="en-US" sz="4000" dirty="0" smtClean="0">
-                <a:latin typeface="Trebuchet MS" pitchFamily="34" charset="0"/>
+            <a:pPr marL="0" indent="0">
+              <a:buNone/>
+            </a:pPr>
+            <a:r>
+              <a:rPr lang="en-US" sz="2400" dirty="0" smtClean="0">
+                <a:solidFill>
+                  <a:srgbClr val="0070C0"/>
+                </a:solidFill>
               </a:rPr>
-              <a:t>!</a:t>
-            </a:r>
-            <a:endParaRPr lang="en-US" sz="4000" dirty="0">
-              <a:latin typeface="Trebuchet MS" pitchFamily="34" charset="0"/>
-            </a:endParaRPr>
+              <a:t>Headroom</a:t>
+            </a:r>
+          </a:p>
+          <a:p>
+            <a:endParaRPr lang="en-US" sz="2400" dirty="0" smtClean="0"/>
+          </a:p>
+          <a:p>
+            <a:r>
+              <a:rPr lang="en-US" sz="2400" dirty="0" smtClean="0"/>
+              <a:t>Extensible</a:t>
+            </a:r>
+          </a:p>
+          <a:p>
+            <a:pPr lvl="1"/>
+            <a:r>
+              <a:rPr lang="en-US" sz="2000" dirty="0" smtClean="0"/>
+              <a:t>Custom Routing</a:t>
+            </a:r>
+          </a:p>
+          <a:p>
+            <a:pPr lvl="1"/>
+            <a:r>
+              <a:rPr lang="en-US" sz="2000" dirty="0" smtClean="0"/>
+              <a:t>Custom View Engine</a:t>
+            </a:r>
+          </a:p>
+          <a:p>
+            <a:pPr lvl="1"/>
+            <a:r>
+              <a:rPr lang="en-US" sz="2000" dirty="0" smtClean="0"/>
+              <a:t>Custom Model/Parameter Binders</a:t>
+            </a:r>
+          </a:p>
+          <a:p>
+            <a:pPr lvl="1"/>
+            <a:r>
+              <a:rPr lang="en-US" sz="2000" dirty="0" smtClean="0"/>
+              <a:t>Custom Action Filters</a:t>
+            </a:r>
+          </a:p>
+          <a:p>
+            <a:pPr lvl="1"/>
+            <a:r>
+              <a:rPr lang="en-US" sz="2000" dirty="0" smtClean="0"/>
+              <a:t>Custom Formatters</a:t>
+            </a:r>
+            <a:endParaRPr lang="en-US" sz="2000" dirty="0" smtClean="0"/>
+          </a:p>
+          <a:p>
+            <a:pPr lvl="1"/>
+            <a:endParaRPr lang="en-US" sz="2000" dirty="0" smtClean="0"/>
+          </a:p>
+          <a:p>
+            <a:r>
+              <a:rPr lang="en-US" sz="2400" dirty="0" smtClean="0"/>
+              <a:t>All code is released as open source</a:t>
+            </a:r>
+            <a:endParaRPr lang="en-US" sz="2400" dirty="0" smtClean="0"/>
           </a:p>
         </p:txBody>
       </p:sp>
     </p:spTree>
+    <p:extLst>
+      <p:ext uri="{BB962C8B-B14F-4D97-AF65-F5344CB8AC3E}">
+        <p14:creationId xmlns:p14="http://schemas.microsoft.com/office/powerpoint/2010/main" val="573997567"/>
+      </p:ext>
+    </p:extLst>
   </p:cSld>
   <p:clrMapOvr>
     <a:masterClrMapping/>
@@ -13065,8 +13919,8 @@
           <a:lstStyle/>
           <a:p>
             <a:r>
-              <a:rPr lang="en-US" dirty="0"/>
-              <a:t>What are the benefits of MVC and Web API?</a:t>
+              <a:rPr lang="en-US" sz="3200" dirty="0"/>
+              <a:t>MVC: The good parts</a:t>
             </a:r>
             <a:endParaRPr lang="en-US" dirty="0"/>
           </a:p>
@@ -13122,25 +13976,13 @@
           <a:p>
             <a:r>
               <a:rPr lang="en-US" sz="2400" dirty="0" smtClean="0"/>
-              <a:t>Cookies, Session, Caching, etc. still work the same</a:t>
-            </a:r>
-          </a:p>
-          <a:p>
-            <a:pPr marL="0" indent="0">
-              <a:buNone/>
-            </a:pPr>
+              <a:t>Cookies, Session, Caching, etc. still work the </a:t>
+            </a:r>
+            <a:r>
+              <a:rPr lang="en-US" sz="2400" dirty="0" smtClean="0"/>
+              <a:t>same</a:t>
+            </a:r>
             <a:endParaRPr lang="en-US" sz="2400" dirty="0" smtClean="0"/>
-          </a:p>
-          <a:p>
-            <a:r>
-              <a:rPr lang="en-US" sz="2400" dirty="0" smtClean="0"/>
-              <a:t>Extensible for changing Routing, View Engine, Model Binders, Action Filters, etc</a:t>
-            </a:r>
-            <a:r>
-              <a:rPr lang="en-US" sz="2400" dirty="0" smtClean="0"/>
-              <a:t>.</a:t>
-            </a:r>
-            <a:endParaRPr lang="en-US" sz="2400" dirty="0"/>
           </a:p>
         </p:txBody>
       </p:sp>
@@ -20322,8 +21164,8 @@
         </p:blipFill>
         <p:spPr>
           <a:xfrm>
-            <a:off x="685800" y="1690689"/>
-            <a:ext cx="8257143" cy="2495238"/>
+            <a:off x="416856" y="1690688"/>
+            <a:ext cx="8526088" cy="2576511"/>
           </a:xfrm>
           <a:prstGeom prst="rect">
             <a:avLst/>

</xml_diff>

<commit_message>
final draft, just needs polishing and timings
</commit_message>
<xml_diff>
--- a/Intro to MVC and Web API - Denver Dev Days/Introduction to MVC and Web API.pptx
+++ b/Intro to MVC and Web API - Denver Dev Days/Introduction to MVC and Web API.pptx
@@ -8877,7 +8877,7 @@
             <a:pPr algn="ctr"/>
             <a:r>
               <a:rPr lang="en-US" sz="4000" dirty="0" smtClean="0"/>
-              <a:t>Demo – Views, Models, and Scaffolding</a:t>
+              <a:t>Demo – Views, Models, Scaffolding and Model Binding</a:t>
             </a:r>
             <a:endParaRPr lang="en-US" sz="4000" dirty="0">
               <a:latin typeface="Trebuchet MS" pitchFamily="34" charset="0"/>
@@ -8937,11 +8937,13 @@
         </p:nvSpPr>
         <p:spPr/>
         <p:txBody>
-          <a:bodyPr/>
+          <a:bodyPr>
+            <a:normAutofit/>
+          </a:bodyPr>
           <a:lstStyle/>
           <a:p>
             <a:r>
-              <a:rPr lang="en-US" sz="3600" dirty="0"/>
+              <a:rPr lang="en-US" sz="3200" dirty="0"/>
               <a:t>MVC: The good parts</a:t>
             </a:r>
           </a:p>
@@ -9106,10 +9108,10 @@
           <a:lstStyle/>
           <a:p>
             <a:r>
-              <a:rPr lang="en-US" sz="3600" dirty="0"/>
+              <a:rPr lang="en-US" sz="3200" dirty="0"/>
               <a:t>MVC: The good parts</a:t>
             </a:r>
-            <a:endParaRPr lang="en-US" sz="3600" dirty="0"/>
+            <a:endParaRPr lang="en-US" sz="3200" dirty="0"/>
           </a:p>
         </p:txBody>
       </p:sp>
@@ -11008,14 +11010,16 @@
         </p:nvSpPr>
         <p:spPr/>
         <p:txBody>
-          <a:bodyPr/>
+          <a:bodyPr>
+            <a:normAutofit/>
+          </a:bodyPr>
           <a:lstStyle/>
           <a:p>
             <a:r>
-              <a:rPr lang="en-US" sz="3600" dirty="0"/>
+              <a:rPr lang="en-US" sz="3200" dirty="0"/>
               <a:t>MVC: The good parts</a:t>
             </a:r>
-            <a:endParaRPr lang="en-US" dirty="0"/>
+            <a:endParaRPr lang="en-US" sz="3200" dirty="0"/>
           </a:p>
         </p:txBody>
       </p:sp>
@@ -11156,10 +11160,10 @@
           <a:lstStyle/>
           <a:p>
             <a:r>
-              <a:rPr lang="en-US" sz="3600" dirty="0"/>
+              <a:rPr lang="en-US" sz="3200" dirty="0"/>
               <a:t>MVC: The good parts</a:t>
             </a:r>
-            <a:endParaRPr lang="en-US" sz="3600" dirty="0"/>
+            <a:endParaRPr lang="en-US" sz="3200" dirty="0"/>
           </a:p>
         </p:txBody>
       </p:sp>
@@ -12572,14 +12576,16 @@
         </p:nvSpPr>
         <p:spPr/>
         <p:txBody>
-          <a:bodyPr/>
+          <a:bodyPr>
+            <a:normAutofit/>
+          </a:bodyPr>
           <a:lstStyle/>
           <a:p>
             <a:r>
-              <a:rPr lang="en-US" sz="3600" dirty="0"/>
+              <a:rPr lang="en-US" sz="3200" dirty="0"/>
               <a:t>MVC: The good parts</a:t>
             </a:r>
-            <a:endParaRPr lang="en-US" dirty="0"/>
+            <a:endParaRPr lang="en-US" sz="3200" dirty="0"/>
           </a:p>
         </p:txBody>
       </p:sp>
@@ -12726,10 +12732,10 @@
           <a:lstStyle/>
           <a:p>
             <a:r>
-              <a:rPr lang="en-US" sz="3600" dirty="0"/>
+              <a:rPr lang="en-US" sz="3200" dirty="0"/>
               <a:t>MVC: The good parts</a:t>
             </a:r>
-            <a:endParaRPr lang="en-US" sz="3600" dirty="0"/>
+            <a:endParaRPr lang="en-US" sz="3200" dirty="0"/>
           </a:p>
         </p:txBody>
       </p:sp>
@@ -14814,7 +14820,7 @@
           <a:p>
             <a:r>
               <a:rPr lang="en-US" dirty="0" smtClean="0"/>
-              <a:t>Today’s web, where do MVC and Web API fit?</a:t>
+              <a:t>Today’s web, where does MVC fit?</a:t>
             </a:r>
             <a:endParaRPr lang="en-US" dirty="0"/>
           </a:p>
@@ -14827,25 +14833,16 @@
             <a:spLocks noGrp="1"/>
           </p:cNvSpPr>
           <p:nvPr>
-            <p:ph sz="half" idx="1"/>
+            <p:ph idx="1"/>
           </p:nvPr>
         </p:nvSpPr>
         <p:spPr/>
         <p:txBody>
           <a:bodyPr>
-            <a:normAutofit fontScale="85000" lnSpcReduction="20000"/>
+            <a:normAutofit/>
           </a:bodyPr>
           <a:lstStyle/>
           <a:p>
-            <a:pPr marL="0" indent="0">
-              <a:buNone/>
-            </a:pPr>
-            <a:r>
-              <a:rPr lang="en-US" sz="2800" dirty="0" smtClean="0"/>
-              <a:t>MVC</a:t>
-            </a:r>
-          </a:p>
-          <a:p>
             <a:r>
               <a:rPr lang="en-US" sz="2600" dirty="0" smtClean="0"/>
               <a:t>ASP.NET security for pages</a:t>
@@ -14878,101 +14875,6 @@
               <a:t>Consistent look with a Layout page</a:t>
             </a:r>
             <a:endParaRPr lang="en-US" sz="2600" dirty="0"/>
-          </a:p>
-        </p:txBody>
-      </p:sp>
-      <p:sp>
-        <p:nvSpPr>
-          <p:cNvPr id="6" name="Content Placeholder 5"/>
-          <p:cNvSpPr>
-            <a:spLocks noGrp="1"/>
-          </p:cNvSpPr>
-          <p:nvPr>
-            <p:ph sz="half" idx="2"/>
-          </p:nvPr>
-        </p:nvSpPr>
-        <p:spPr/>
-        <p:txBody>
-          <a:bodyPr>
-            <a:normAutofit fontScale="85000" lnSpcReduction="20000"/>
-          </a:bodyPr>
-          <a:lstStyle/>
-          <a:p>
-            <a:pPr marL="0" indent="0">
-              <a:buNone/>
-            </a:pPr>
-            <a:r>
-              <a:rPr lang="en-US" sz="2800" dirty="0" smtClean="0"/>
-              <a:t>Web API</a:t>
-            </a:r>
-          </a:p>
-          <a:p>
-            <a:r>
-              <a:rPr lang="en-US" sz="2600" dirty="0" smtClean="0"/>
-              <a:t>ASP.NET security for data calls</a:t>
-            </a:r>
-          </a:p>
-          <a:p>
-            <a:endParaRPr lang="en-US" sz="2600" dirty="0" smtClean="0"/>
-          </a:p>
-          <a:p>
-            <a:r>
-              <a:rPr lang="en-US" sz="2600" dirty="0" smtClean="0"/>
-              <a:t>Parameter binding, </a:t>
-            </a:r>
-            <a:r>
-              <a:rPr lang="en-US" sz="2600" dirty="0"/>
-              <a:t>server-side validation</a:t>
-            </a:r>
-            <a:endParaRPr lang="en-US" sz="2600" dirty="0" smtClean="0"/>
-          </a:p>
-          <a:p>
-            <a:endParaRPr lang="en-US" sz="2600" dirty="0" smtClean="0"/>
-          </a:p>
-          <a:p>
-            <a:r>
-              <a:rPr lang="en-US" sz="2600" dirty="0"/>
-              <a:t>Content </a:t>
-            </a:r>
-            <a:r>
-              <a:rPr lang="en-US" sz="2600" dirty="0" smtClean="0"/>
-              <a:t>negotiation to send JSON, XML, etc.</a:t>
-            </a:r>
-            <a:endParaRPr lang="en-US" sz="2600" dirty="0"/>
-          </a:p>
-          <a:p>
-            <a:endParaRPr lang="en-US" sz="2600" dirty="0" smtClean="0"/>
-          </a:p>
-          <a:p>
-            <a:r>
-              <a:rPr lang="en-US" sz="2600" dirty="0" smtClean="0"/>
-              <a:t>Easy way to get JSON to the client</a:t>
-            </a:r>
-          </a:p>
-          <a:p>
-            <a:endParaRPr lang="en-US" sz="2600" dirty="0" smtClean="0"/>
-          </a:p>
-          <a:p>
-            <a:r>
-              <a:rPr lang="en-US" sz="2600" dirty="0" smtClean="0"/>
-              <a:t>Clean, predictable REST </a:t>
-            </a:r>
-            <a:r>
-              <a:rPr lang="en-US" sz="2600" dirty="0" err="1" smtClean="0"/>
-              <a:t>api</a:t>
-            </a:r>
-            <a:r>
-              <a:rPr lang="en-US" sz="2600" dirty="0" smtClean="0"/>
-              <a:t> for people outside your </a:t>
-            </a:r>
-            <a:r>
-              <a:rPr lang="en-US" sz="2600" dirty="0" err="1" smtClean="0"/>
-              <a:t>dev</a:t>
-            </a:r>
-            <a:r>
-              <a:rPr lang="en-US" sz="2600" dirty="0" smtClean="0"/>
-              <a:t> team</a:t>
-            </a:r>
           </a:p>
         </p:txBody>
       </p:sp>

</xml_diff>